<commit_message>
sdk detailed view without EULA
</commit_message>
<xml_diff>
--- a/SDKUserGuide/images/sdk_content.pptx
+++ b/SDKUserGuide/images/sdk_content.pptx
@@ -4419,7 +4419,7 @@
         </p:nvSpPr>
         <p:spPr>
           <a:xfrm>
-            <a:off x="6897105" y="2533066"/>
+            <a:off x="6897105" y="2348880"/>
             <a:ext cx="2435650" cy="1733533"/>
           </a:xfrm>
           <a:prstGeom prst="roundRect">
@@ -4474,7 +4474,7 @@
         <p:spPr>
           <a:xfrm>
             <a:off x="6872392" y="530332"/>
-            <a:ext cx="2460363" cy="1825250"/>
+            <a:ext cx="2460363" cy="1472046"/>
           </a:xfrm>
           <a:prstGeom prst="roundRect">
             <a:avLst>
@@ -4527,7 +4527,7 @@
         </p:nvSpPr>
         <p:spPr>
           <a:xfrm>
-            <a:off x="922655" y="4310180"/>
+            <a:off x="2373173" y="4267539"/>
             <a:ext cx="3301138" cy="1495084"/>
           </a:xfrm>
           <a:prstGeom prst="roundRect">
@@ -4619,7 +4619,7 @@
         </p:nvSpPr>
         <p:spPr>
           <a:xfrm>
-            <a:off x="7010189" y="1424566"/>
+            <a:off x="6984768" y="1077829"/>
             <a:ext cx="2423178" cy="861774"/>
           </a:xfrm>
           <a:prstGeom prst="rect">
@@ -4694,7 +4694,7 @@
         </p:nvSpPr>
         <p:spPr>
           <a:xfrm>
-            <a:off x="991099" y="4376476"/>
+            <a:off x="2441617" y="4333835"/>
             <a:ext cx="2260852" cy="307777"/>
           </a:xfrm>
           <a:prstGeom prst="rect">
@@ -4740,7 +4740,7 @@
         </p:nvSpPr>
         <p:spPr>
           <a:xfrm>
-            <a:off x="6938994" y="2640675"/>
+            <a:off x="6938994" y="2456489"/>
             <a:ext cx="1909130" cy="307777"/>
           </a:xfrm>
           <a:prstGeom prst="rect">
@@ -4766,55 +4766,6 @@
               <a:latin typeface="Source Sans Pro" charset="0"/>
               <a:ea typeface="Source Sans Pro" charset="0"/>
               <a:cs typeface="Source Sans Pro" charset="0"/>
-            </a:endParaRPr>
-          </a:p>
-        </p:txBody>
-      </p:sp>
-      <p:sp>
-        <p:nvSpPr>
-          <p:cNvPr id="11" name="Rectangle 10"/>
-          <p:cNvSpPr/>
-          <p:nvPr/>
-        </p:nvSpPr>
-        <p:spPr>
-          <a:xfrm>
-            <a:off x="2295585" y="3884366"/>
-            <a:ext cx="4217520" cy="246221"/>
-          </a:xfrm>
-          <a:prstGeom prst="rect">
-            <a:avLst/>
-          </a:prstGeom>
-        </p:spPr>
-        <p:txBody>
-          <a:bodyPr wrap="square">
-            <a:spAutoFit/>
-          </a:bodyPr>
-          <a:lstStyle/>
-          <a:p>
-            <a:pPr algn="ctr"/>
-            <a:r>
-              <a:rPr lang="en-US" sz="1000" dirty="0">
-                <a:solidFill>
-                  <a:schemeClr val="accent1"/>
-                </a:solidFill>
-                <a:latin typeface="Consolas" panose="020B0609020204030204" pitchFamily="49" charset="0"/>
-              </a:rPr>
-              <a:t>MICROEJ SDK </a:t>
-            </a:r>
-            <a:r>
-              <a:rPr lang="en-US" sz="1000" dirty="0" smtClean="0">
-                <a:solidFill>
-                  <a:schemeClr val="accent1"/>
-                </a:solidFill>
-                <a:latin typeface="Consolas" panose="020B0609020204030204" pitchFamily="49" charset="0"/>
-              </a:rPr>
-              <a:t>End User License Agreement (EULA)</a:t>
-            </a:r>
-            <a:endParaRPr lang="en-US" sz="1000" dirty="0">
-              <a:solidFill>
-                <a:schemeClr val="accent1"/>
-              </a:solidFill>
-              <a:latin typeface="Consolas" panose="020B0609020204030204" pitchFamily="49" charset="0"/>
             </a:endParaRPr>
           </a:p>
         </p:txBody>
@@ -5086,7 +5037,7 @@
         </p:blipFill>
         <p:spPr>
           <a:xfrm>
-            <a:off x="8749573" y="2623123"/>
+            <a:off x="8749573" y="2438937"/>
             <a:ext cx="561322" cy="461297"/>
           </a:xfrm>
           <a:prstGeom prst="rect">
@@ -5102,7 +5053,7 @@
         </p:nvSpPr>
         <p:spPr>
           <a:xfrm>
-            <a:off x="7010973" y="3041665"/>
+            <a:off x="7010973" y="2857479"/>
             <a:ext cx="2367435" cy="1323439"/>
           </a:xfrm>
           <a:prstGeom prst="rect">
@@ -5192,7 +5143,7 @@
         </p:nvSpPr>
         <p:spPr>
           <a:xfrm>
-            <a:off x="1189031" y="4895808"/>
+            <a:off x="2639549" y="4853167"/>
             <a:ext cx="2652977" cy="861774"/>
           </a:xfrm>
           <a:prstGeom prst="rect">
@@ -5546,7 +5497,7 @@
           <p:cNvPr id="30" name="Picture 29">
             <a:extLst>
               <a:ext uri="{FF2B5EF4-FFF2-40B4-BE49-F238E27FC236}">
-                <a16:creationId xmlns="" xmlns:a16="http://schemas.microsoft.com/office/drawing/2014/main" id="{72176D6D-182A-4BB5-8EA3-0ACC3EEFD101}"/>
+                <a16:creationId xmlns:a16="http://schemas.microsoft.com/office/drawing/2014/main" xmlns="" id="{72176D6D-182A-4BB5-8EA3-0ACC3EEFD101}"/>
               </a:ext>
             </a:extLst>
           </p:cNvPr>
@@ -5569,7 +5520,7 @@
         </p:blipFill>
         <p:spPr>
           <a:xfrm>
-            <a:off x="3304370" y="4414606"/>
+            <a:off x="4754888" y="4371965"/>
             <a:ext cx="835351" cy="276999"/>
           </a:xfrm>
           <a:prstGeom prst="rect">
@@ -5577,55 +5528,6 @@
           </a:prstGeom>
         </p:spPr>
       </p:pic>
-      <p:sp>
-        <p:nvSpPr>
-          <p:cNvPr id="118" name="Rounded Rectangle 117"/>
-          <p:cNvSpPr/>
-          <p:nvPr/>
-        </p:nvSpPr>
-        <p:spPr>
-          <a:xfrm>
-            <a:off x="839416" y="476672"/>
-            <a:ext cx="5932364" cy="3653915"/>
-          </a:xfrm>
-          <a:prstGeom prst="roundRect">
-            <a:avLst>
-              <a:gd name="adj" fmla="val 6443"/>
-            </a:avLst>
-          </a:prstGeom>
-          <a:noFill/>
-          <a:ln w="12700">
-            <a:solidFill>
-              <a:schemeClr val="accent1"/>
-            </a:solidFill>
-            <a:prstDash val="dash"/>
-          </a:ln>
-        </p:spPr>
-        <p:style>
-          <a:lnRef idx="2">
-            <a:schemeClr val="accent1">
-              <a:shade val="50000"/>
-            </a:schemeClr>
-          </a:lnRef>
-          <a:fillRef idx="1">
-            <a:schemeClr val="accent1"/>
-          </a:fillRef>
-          <a:effectRef idx="0">
-            <a:schemeClr val="accent1"/>
-          </a:effectRef>
-          <a:fontRef idx="minor">
-            <a:schemeClr val="lt1"/>
-          </a:fontRef>
-        </p:style>
-        <p:txBody>
-          <a:bodyPr rtlCol="0" anchor="ctr"/>
-          <a:lstStyle/>
-          <a:p>
-            <a:pPr algn="ctr"/>
-            <a:endParaRPr lang="en-US" dirty="0"/>
-          </a:p>
-        </p:txBody>
-      </p:sp>
       <p:sp>
         <p:nvSpPr>
           <p:cNvPr id="33" name="TextBox 32"/>
@@ -5670,7 +5572,7 @@
           <p:cNvPr id="102" name="Picture 101">
             <a:extLst>
               <a:ext uri="{FF2B5EF4-FFF2-40B4-BE49-F238E27FC236}">
-                <a16:creationId xmlns:a16="http://schemas.microsoft.com/office/drawing/2014/main" xmlns="" id="{6E47523C-39E3-414E-8E44-2AF044AA7D00}"/>
+                <a16:creationId xmlns="" xmlns:a16="http://schemas.microsoft.com/office/drawing/2014/main" id="{6E47523C-39E3-414E-8E44-2AF044AA7D00}"/>
               </a:ext>
             </a:extLst>
           </p:cNvPr>
@@ -5838,120 +5740,6 @@
           </a:prstGeom>
         </p:spPr>
       </p:pic>
-      <p:sp>
-        <p:nvSpPr>
-          <p:cNvPr id="41" name="Rounded Rectangle 40"/>
-          <p:cNvSpPr/>
-          <p:nvPr/>
-        </p:nvSpPr>
-        <p:spPr>
-          <a:xfrm>
-            <a:off x="7004927" y="1098381"/>
-            <a:ext cx="538867" cy="200055"/>
-          </a:xfrm>
-          <a:prstGeom prst="roundRect">
-            <a:avLst>
-              <a:gd name="adj" fmla="val 6443"/>
-            </a:avLst>
-          </a:prstGeom>
-          <a:noFill/>
-          <a:ln w="12700">
-            <a:solidFill>
-              <a:schemeClr val="accent1"/>
-            </a:solidFill>
-            <a:prstDash val="dash"/>
-          </a:ln>
-        </p:spPr>
-        <p:style>
-          <a:lnRef idx="2">
-            <a:schemeClr val="accent1">
-              <a:shade val="50000"/>
-            </a:schemeClr>
-          </a:lnRef>
-          <a:fillRef idx="1">
-            <a:schemeClr val="accent1"/>
-          </a:fillRef>
-          <a:effectRef idx="0">
-            <a:schemeClr val="accent1"/>
-          </a:effectRef>
-          <a:fontRef idx="minor">
-            <a:schemeClr val="lt1"/>
-          </a:fontRef>
-        </p:style>
-        <p:txBody>
-          <a:bodyPr rtlCol="0" anchor="ctr"/>
-          <a:lstStyle/>
-          <a:p>
-            <a:pPr algn="ctr"/>
-            <a:endParaRPr lang="en-US" dirty="0"/>
-          </a:p>
-        </p:txBody>
-      </p:sp>
-      <p:sp>
-        <p:nvSpPr>
-          <p:cNvPr id="34" name="TextBox 33"/>
-          <p:cNvSpPr txBox="1"/>
-          <p:nvPr/>
-        </p:nvSpPr>
-        <p:spPr>
-          <a:xfrm>
-            <a:off x="6934961" y="790988"/>
-            <a:ext cx="2423178" cy="553998"/>
-          </a:xfrm>
-          <a:prstGeom prst="rect">
-            <a:avLst/>
-          </a:prstGeom>
-          <a:noFill/>
-        </p:spPr>
-        <p:txBody>
-          <a:bodyPr wrap="square" rtlCol="0">
-            <a:spAutoFit/>
-          </a:bodyPr>
-          <a:lstStyle>
-            <a:defPPr>
-              <a:defRPr lang="en-US"/>
-            </a:defPPr>
-            <a:lvl1pPr marL="285750" indent="-285750">
-              <a:buFont typeface="Arial" panose="020B0604020202020204" pitchFamily="34" charset="0"/>
-              <a:buChar char="•"/>
-              <a:defRPr sz="1000">
-                <a:latin typeface="Source Sans Pro" charset="0"/>
-                <a:ea typeface="Source Sans Pro" charset="0"/>
-                <a:cs typeface="Source Sans Pro" charset="0"/>
-              </a:defRPr>
-            </a:lvl1pPr>
-          </a:lstStyle>
-          <a:p>
-            <a:pPr marL="0" indent="0">
-              <a:lnSpc>
-                <a:spcPct val="150000"/>
-              </a:lnSpc>
-              <a:buNone/>
-            </a:pPr>
-            <a:r>
-              <a:rPr lang="en-US" i="1" dirty="0" smtClean="0"/>
-              <a:t>Various Licenses</a:t>
-            </a:r>
-          </a:p>
-          <a:p>
-            <a:pPr marL="0" indent="0">
-              <a:lnSpc>
-                <a:spcPct val="150000"/>
-              </a:lnSpc>
-              <a:buNone/>
-            </a:pPr>
-            <a:r>
-              <a:rPr lang="en-US" i="1" dirty="0" smtClean="0"/>
-              <a:t>SDK EULA , Apache , Eclipse , BSD, etc</a:t>
-            </a:r>
-            <a:r>
-              <a:rPr lang="en-US" i="1" dirty="0"/>
-              <a:t>.</a:t>
-            </a:r>
-            <a:endParaRPr lang="en-US" i="1" dirty="0" smtClean="0"/>
-          </a:p>
-        </p:txBody>
-      </p:sp>
     </p:spTree>
     <p:extLst>
       <p:ext uri="{BB962C8B-B14F-4D97-AF65-F5344CB8AC3E}">

</xml_diff>

<commit_message>
Rename Platform to VEE Port in SDK content
</commit_message>
<xml_diff>
--- a/SDKUserGuide/images/sdk_content.pptx
+++ b/SDKUserGuide/images/sdk_content.pptx
@@ -230,7 +230,7 @@
               <a:rPr lang="fr-FR" smtClean="0">
                 <a:latin typeface="Calibri Regular" charset="0"/>
               </a:rPr>
-              <a:t>avril 22</a:t>
+              <a:t>août 23</a:t>
             </a:fld>
             <a:endParaRPr lang="en-US" dirty="0">
               <a:latin typeface="Calibri Regular" charset="0"/>
@@ -409,7 +409,7 @@
             <a:fld id="{79958FA1-9FE8-F149-AB4B-7DC9950B39E9}" type="datetime6">
               <a:rPr lang="fr-FR" smtClean="0"/>
               <a:pPr/>
-              <a:t>avril 22</a:t>
+              <a:t>août 23</a:t>
             </a:fld>
             <a:endParaRPr lang="en-US" dirty="0"/>
           </a:p>
@@ -1164,7 +1164,7 @@
           <a:p>
             <a:fld id="{7E8DAAE0-7A9E-9F46-B84D-C44AC8DB25A2}" type="datetime6">
               <a:rPr lang="fr-FR" smtClean="0"/>
-              <a:t>avril 22</a:t>
+              <a:t>août 23</a:t>
             </a:fld>
             <a:endParaRPr lang="en-US" dirty="0"/>
           </a:p>
@@ -1314,7 +1314,7 @@
           <a:p>
             <a:fld id="{F9582307-04DB-2F4D-BDB0-614E4902BA9E}" type="datetime6">
               <a:rPr lang="fr-FR" smtClean="0"/>
-              <a:t>avril 22</a:t>
+              <a:t>août 23</a:t>
             </a:fld>
             <a:endParaRPr lang="en-US" dirty="0"/>
           </a:p>
@@ -1460,7 +1460,7 @@
           <a:p>
             <a:fld id="{180A4ADF-D2E2-C44F-9BED-DE909ECFAA4C}" type="datetime6">
               <a:rPr lang="fr-FR" smtClean="0"/>
-              <a:t>avril 22</a:t>
+              <a:t>août 23</a:t>
             </a:fld>
             <a:endParaRPr lang="en-US" dirty="0"/>
           </a:p>
@@ -1661,7 +1661,7 @@
             <a:fld id="{22DD8F49-BF83-0E4D-8954-2DA98C3220A2}" type="datetime6">
               <a:rPr lang="fr-FR" smtClean="0"/>
               <a:pPr/>
-              <a:t>avril 22</a:t>
+              <a:t>août 23</a:t>
             </a:fld>
             <a:endParaRPr lang="en-US" dirty="0"/>
           </a:p>
@@ -2212,7 +2212,7 @@
           <p:cNvPr id="10" name="Picture 9">
             <a:extLst>
               <a:ext uri="{FF2B5EF4-FFF2-40B4-BE49-F238E27FC236}">
-                <a16:creationId xmlns="" xmlns:a16="http://schemas.microsoft.com/office/drawing/2014/main" id="{0D3D4444-B917-2444-A320-631533C06D73}"/>
+                <a16:creationId xmlns:a16="http://schemas.microsoft.com/office/drawing/2014/main" id="{0D3D4444-B917-2444-A320-631533C06D73}"/>
               </a:ext>
             </a:extLst>
           </p:cNvPr>
@@ -2611,7 +2611,7 @@
             <a:fld id="{22DD8F49-BF83-0E4D-8954-2DA98C3220A2}" type="datetime6">
               <a:rPr lang="fr-FR" smtClean="0"/>
               <a:pPr/>
-              <a:t>avril 22</a:t>
+              <a:t>août 23</a:t>
             </a:fld>
             <a:endParaRPr lang="en-US" dirty="0"/>
           </a:p>
@@ -3005,7 +3005,7 @@
             <a:fld id="{22DD8F49-BF83-0E4D-8954-2DA98C3220A2}" type="datetime6">
               <a:rPr lang="fr-FR" smtClean="0"/>
               <a:pPr/>
-              <a:t>avril 22</a:t>
+              <a:t>août 23</a:t>
             </a:fld>
             <a:endParaRPr lang="en-US" dirty="0"/>
           </a:p>
@@ -3455,7 +3455,7 @@
             <a:fld id="{22DD8F49-BF83-0E4D-8954-2DA98C3220A2}" type="datetime6">
               <a:rPr lang="fr-FR" smtClean="0"/>
               <a:pPr/>
-              <a:t>avril 22</a:t>
+              <a:t>août 23</a:t>
             </a:fld>
             <a:endParaRPr lang="en-US" dirty="0"/>
           </a:p>
@@ -3891,7 +3891,7 @@
             <a:fld id="{22DD8F49-BF83-0E4D-8954-2DA98C3220A2}" type="datetime6">
               <a:rPr lang="fr-FR" smtClean="0"/>
               <a:pPr/>
-              <a:t>avril 22</a:t>
+              <a:t>août 23</a:t>
             </a:fld>
             <a:endParaRPr lang="en-US" dirty="0"/>
           </a:p>
@@ -4429,7 +4429,7 @@
             <a:fld id="{22DD8F49-BF83-0E4D-8954-2DA98C3220A2}" type="datetime6">
               <a:rPr lang="fr-FR" smtClean="0"/>
               <a:pPr/>
-              <a:t>avril 22</a:t>
+              <a:t>août 23</a:t>
             </a:fld>
             <a:endParaRPr lang="en-US" dirty="0"/>
           </a:p>
@@ -4809,7 +4809,7 @@
             <a:fld id="{22DD8F49-BF83-0E4D-8954-2DA98C3220A2}" type="datetime6">
               <a:rPr lang="fr-FR" smtClean="0"/>
               <a:pPr/>
-              <a:t>avril 22</a:t>
+              <a:t>août 23</a:t>
             </a:fld>
             <a:endParaRPr lang="en-US" dirty="0"/>
           </a:p>
@@ -5053,7 +5053,7 @@
             <a:fld id="{22DD8F49-BF83-0E4D-8954-2DA98C3220A2}" type="datetime6">
               <a:rPr lang="fr-FR" smtClean="0"/>
               <a:pPr/>
-              <a:t>avril 22</a:t>
+              <a:t>août 23</a:t>
             </a:fld>
             <a:endParaRPr lang="en-US" dirty="0"/>
           </a:p>
@@ -5360,7 +5360,7 @@
             <a:fld id="{22DD8F49-BF83-0E4D-8954-2DA98C3220A2}" type="datetime6">
               <a:rPr lang="fr-FR" smtClean="0"/>
               <a:pPr/>
-              <a:t>avril 22</a:t>
+              <a:t>août 23</a:t>
             </a:fld>
             <a:endParaRPr lang="en-US" dirty="0"/>
           </a:p>
@@ -5564,7 +5564,7 @@
             <a:fld id="{22DD8F49-BF83-0E4D-8954-2DA98C3220A2}" type="datetime6">
               <a:rPr lang="fr-FR" smtClean="0"/>
               <a:pPr/>
-              <a:t>avril 22</a:t>
+              <a:t>août 23</a:t>
             </a:fld>
             <a:endParaRPr lang="en-US" dirty="0"/>
           </a:p>
@@ -5620,7 +5620,7 @@
           <p:cNvPr id="7" name="Text Placeholder 2">
             <a:extLst>
               <a:ext uri="{FF2B5EF4-FFF2-40B4-BE49-F238E27FC236}">
-                <a16:creationId xmlns="" xmlns:a16="http://schemas.microsoft.com/office/drawing/2014/main" id="{EE9EA528-AAC2-D34E-8538-0A0AAD80AD96}"/>
+                <a16:creationId xmlns:a16="http://schemas.microsoft.com/office/drawing/2014/main" id="{EE9EA528-AAC2-D34E-8538-0A0AAD80AD96}"/>
               </a:ext>
             </a:extLst>
           </p:cNvPr>
@@ -5706,7 +5706,7 @@
           <p:cNvPr id="10" name="Content Placeholder 3">
             <a:extLst>
               <a:ext uri="{FF2B5EF4-FFF2-40B4-BE49-F238E27FC236}">
-                <a16:creationId xmlns="" xmlns:a16="http://schemas.microsoft.com/office/drawing/2014/main" id="{DAF8326C-6710-4047-962C-1C0A0F78FFB5}"/>
+                <a16:creationId xmlns:a16="http://schemas.microsoft.com/office/drawing/2014/main" id="{DAF8326C-6710-4047-962C-1C0A0F78FFB5}"/>
               </a:ext>
             </a:extLst>
           </p:cNvPr>
@@ -6013,7 +6013,7 @@
             <a:fld id="{22DD8F49-BF83-0E4D-8954-2DA98C3220A2}" type="datetime6">
               <a:rPr lang="fr-FR" smtClean="0"/>
               <a:pPr/>
-              <a:t>avril 22</a:t>
+              <a:t>août 23</a:t>
             </a:fld>
             <a:endParaRPr lang="en-US" dirty="0"/>
           </a:p>
@@ -6307,7 +6307,7 @@
             <a:fld id="{22DD8F49-BF83-0E4D-8954-2DA98C3220A2}" type="datetime6">
               <a:rPr lang="fr-FR" smtClean="0"/>
               <a:pPr/>
-              <a:t>avril 22</a:t>
+              <a:t>août 23</a:t>
             </a:fld>
             <a:endParaRPr lang="en-US" dirty="0"/>
           </a:p>
@@ -6403,7 +6403,7 @@
           <p:cNvPr id="7" name="Text Placeholder 2">
             <a:extLst>
               <a:ext uri="{FF2B5EF4-FFF2-40B4-BE49-F238E27FC236}">
-                <a16:creationId xmlns="" xmlns:a16="http://schemas.microsoft.com/office/drawing/2014/main" id="{BADF2A12-0EA6-EC4F-864C-2E94AC36ADCE}"/>
+                <a16:creationId xmlns:a16="http://schemas.microsoft.com/office/drawing/2014/main" id="{BADF2A12-0EA6-EC4F-864C-2E94AC36ADCE}"/>
               </a:ext>
             </a:extLst>
           </p:cNvPr>
@@ -6944,7 +6944,7 @@
             <a:fld id="{22DD8F49-BF83-0E4D-8954-2DA98C3220A2}" type="datetime6">
               <a:rPr lang="fr-FR" smtClean="0"/>
               <a:pPr/>
-              <a:t>avril 22</a:t>
+              <a:t>août 23</a:t>
             </a:fld>
             <a:endParaRPr lang="en-US" dirty="0"/>
           </a:p>
@@ -7141,7 +7141,7 @@
             <a:fld id="{22DD8F49-BF83-0E4D-8954-2DA98C3220A2}" type="datetime6">
               <a:rPr lang="fr-FR" smtClean="0"/>
               <a:pPr/>
-              <a:t>avril 22</a:t>
+              <a:t>août 23</a:t>
             </a:fld>
             <a:endParaRPr lang="en-US" dirty="0"/>
           </a:p>
@@ -7237,7 +7237,7 @@
           <p:cNvPr id="7" name="Content Placeholder 3">
             <a:extLst>
               <a:ext uri="{FF2B5EF4-FFF2-40B4-BE49-F238E27FC236}">
-                <a16:creationId xmlns="" xmlns:a16="http://schemas.microsoft.com/office/drawing/2014/main" id="{2E4978A6-AF2C-644A-9245-7D0BA4E8B6CE}"/>
+                <a16:creationId xmlns:a16="http://schemas.microsoft.com/office/drawing/2014/main" id="{2E4978A6-AF2C-644A-9245-7D0BA4E8B6CE}"/>
               </a:ext>
             </a:extLst>
           </p:cNvPr>
@@ -7545,7 +7545,7 @@
             <a:fld id="{22DD8F49-BF83-0E4D-8954-2DA98C3220A2}" type="datetime6">
               <a:rPr lang="fr-FR" smtClean="0"/>
               <a:pPr/>
-              <a:t>avril 22</a:t>
+              <a:t>août 23</a:t>
             </a:fld>
             <a:endParaRPr lang="en-US" dirty="0"/>
           </a:p>
@@ -7641,7 +7641,7 @@
           <p:cNvPr id="7" name="Text Placeholder 2">
             <a:extLst>
               <a:ext uri="{FF2B5EF4-FFF2-40B4-BE49-F238E27FC236}">
-                <a16:creationId xmlns="" xmlns:a16="http://schemas.microsoft.com/office/drawing/2014/main" id="{BADF2A12-0EA6-EC4F-864C-2E94AC36ADCE}"/>
+                <a16:creationId xmlns:a16="http://schemas.microsoft.com/office/drawing/2014/main" id="{BADF2A12-0EA6-EC4F-864C-2E94AC36ADCE}"/>
               </a:ext>
             </a:extLst>
           </p:cNvPr>
@@ -8644,7 +8644,7 @@
             <a:fld id="{22DD8F49-BF83-0E4D-8954-2DA98C3220A2}" type="datetime6">
               <a:rPr lang="fr-FR" smtClean="0"/>
               <a:pPr/>
-              <a:t>avril 22</a:t>
+              <a:t>août 23</a:t>
             </a:fld>
             <a:endParaRPr lang="en-US" dirty="0"/>
           </a:p>
@@ -8806,7 +8806,7 @@
             <a:fld id="{22DD8F49-BF83-0E4D-8954-2DA98C3220A2}" type="datetime6">
               <a:rPr lang="fr-FR" smtClean="0"/>
               <a:pPr/>
-              <a:t>avril 22</a:t>
+              <a:t>août 23</a:t>
             </a:fld>
             <a:endParaRPr lang="en-US" dirty="0"/>
           </a:p>
@@ -8893,7 +8893,7 @@
           <p:cNvPr id="13" name="Rectangle 12">
             <a:extLst>
               <a:ext uri="{FF2B5EF4-FFF2-40B4-BE49-F238E27FC236}">
-                <a16:creationId xmlns="" xmlns:a16="http://schemas.microsoft.com/office/drawing/2014/main" id="{200F2B4F-ED74-D84B-A5FF-644A79E13221}"/>
+                <a16:creationId xmlns:a16="http://schemas.microsoft.com/office/drawing/2014/main" id="{200F2B4F-ED74-D84B-A5FF-644A79E13221}"/>
               </a:ext>
             </a:extLst>
           </p:cNvPr>
@@ -9133,7 +9133,7 @@
           <p:cNvPr id="14" name="Footer Placeholder 5">
             <a:extLst>
               <a:ext uri="{FF2B5EF4-FFF2-40B4-BE49-F238E27FC236}">
-                <a16:creationId xmlns="" xmlns:a16="http://schemas.microsoft.com/office/drawing/2014/main" id="{9D0AEA00-A11E-E447-A27D-E3693067A9E6}"/>
+                <a16:creationId xmlns:a16="http://schemas.microsoft.com/office/drawing/2014/main" id="{9D0AEA00-A11E-E447-A27D-E3693067A9E6}"/>
               </a:ext>
             </a:extLst>
           </p:cNvPr>
@@ -9181,7 +9181,7 @@
           <p:cNvPr id="16" name="Picture 2" descr="C:\Users\cmorineau\Marketing-Private\Marcom\Graphics\Artwork_Corp\Logos\Logo-microej-grey-h50.png">
             <a:extLst>
               <a:ext uri="{FF2B5EF4-FFF2-40B4-BE49-F238E27FC236}">
-                <a16:creationId xmlns="" xmlns:a16="http://schemas.microsoft.com/office/drawing/2014/main" id="{75E7AEDB-C69E-AA4C-96BC-8D040A4C81DB}"/>
+                <a16:creationId xmlns:a16="http://schemas.microsoft.com/office/drawing/2014/main" id="{75E7AEDB-C69E-AA4C-96BC-8D040A4C81DB}"/>
               </a:ext>
             </a:extLst>
           </p:cNvPr>
@@ -9295,7 +9295,7 @@
             <a:fld id="{22DD8F49-BF83-0E4D-8954-2DA98C3220A2}" type="datetime6">
               <a:rPr lang="fr-FR" smtClean="0"/>
               <a:pPr/>
-              <a:t>avril 22</a:t>
+              <a:t>août 23</a:t>
             </a:fld>
             <a:endParaRPr lang="en-US" dirty="0"/>
           </a:p>
@@ -9351,7 +9351,7 @@
           <p:cNvPr id="11" name="Picture 10">
             <a:extLst>
               <a:ext uri="{FF2B5EF4-FFF2-40B4-BE49-F238E27FC236}">
-                <a16:creationId xmlns="" xmlns:a16="http://schemas.microsoft.com/office/drawing/2014/main" id="{21EA2856-E9E7-8D44-8863-70888E0D7F19}"/>
+                <a16:creationId xmlns:a16="http://schemas.microsoft.com/office/drawing/2014/main" id="{21EA2856-E9E7-8D44-8863-70888E0D7F19}"/>
               </a:ext>
             </a:extLst>
           </p:cNvPr>
@@ -9387,7 +9387,7 @@
           <p:cNvPr id="15" name="Title Placeholder 1">
             <a:extLst>
               <a:ext uri="{FF2B5EF4-FFF2-40B4-BE49-F238E27FC236}">
-                <a16:creationId xmlns="" xmlns:a16="http://schemas.microsoft.com/office/drawing/2014/main" id="{ED4F756F-313C-9A45-AA9F-4637139720F4}"/>
+                <a16:creationId xmlns:a16="http://schemas.microsoft.com/office/drawing/2014/main" id="{ED4F756F-313C-9A45-AA9F-4637139720F4}"/>
               </a:ext>
             </a:extLst>
           </p:cNvPr>
@@ -9442,7 +9442,7 @@
           <p:cNvPr id="16" name="Picture 15">
             <a:extLst>
               <a:ext uri="{FF2B5EF4-FFF2-40B4-BE49-F238E27FC236}">
-                <a16:creationId xmlns="" xmlns:a16="http://schemas.microsoft.com/office/drawing/2014/main" id="{A9288502-3773-1F4B-A16F-58C59F5FD419}"/>
+                <a16:creationId xmlns:a16="http://schemas.microsoft.com/office/drawing/2014/main" id="{A9288502-3773-1F4B-A16F-58C59F5FD419}"/>
               </a:ext>
             </a:extLst>
           </p:cNvPr>
@@ -9478,7 +9478,7 @@
           <p:cNvPr id="32" name="Straight Connector 31">
             <a:extLst>
               <a:ext uri="{FF2B5EF4-FFF2-40B4-BE49-F238E27FC236}">
-                <a16:creationId xmlns="" xmlns:a16="http://schemas.microsoft.com/office/drawing/2014/main" id="{158023E0-65D2-F849-83D8-A55E2AC6BB63}"/>
+                <a16:creationId xmlns:a16="http://schemas.microsoft.com/office/drawing/2014/main" id="{158023E0-65D2-F849-83D8-A55E2AC6BB63}"/>
               </a:ext>
             </a:extLst>
           </p:cNvPr>
@@ -9516,7 +9516,7 @@
           <p:cNvPr id="36" name="Straight Connector 35">
             <a:extLst>
               <a:ext uri="{FF2B5EF4-FFF2-40B4-BE49-F238E27FC236}">
-                <a16:creationId xmlns="" xmlns:a16="http://schemas.microsoft.com/office/drawing/2014/main" id="{1C61BB10-90B1-A04F-AB02-727027D1950C}"/>
+                <a16:creationId xmlns:a16="http://schemas.microsoft.com/office/drawing/2014/main" id="{1C61BB10-90B1-A04F-AB02-727027D1950C}"/>
               </a:ext>
             </a:extLst>
           </p:cNvPr>
@@ -9559,7 +9559,7 @@
           <p:cNvPr id="37" name="Content Placeholder 3">
             <a:extLst>
               <a:ext uri="{FF2B5EF4-FFF2-40B4-BE49-F238E27FC236}">
-                <a16:creationId xmlns="" xmlns:a16="http://schemas.microsoft.com/office/drawing/2014/main" id="{E6FA2AB0-B1DC-CE4F-BA00-6F224EAE5B8E}"/>
+                <a16:creationId xmlns:a16="http://schemas.microsoft.com/office/drawing/2014/main" id="{E6FA2AB0-B1DC-CE4F-BA00-6F224EAE5B8E}"/>
               </a:ext>
             </a:extLst>
           </p:cNvPr>
@@ -9655,7 +9655,7 @@
           <p:cNvPr id="17" name="Content Placeholder 3">
             <a:extLst>
               <a:ext uri="{FF2B5EF4-FFF2-40B4-BE49-F238E27FC236}">
-                <a16:creationId xmlns="" xmlns:a16="http://schemas.microsoft.com/office/drawing/2014/main" id="{A143064D-45EC-0A4F-88C5-9640D09D7651}"/>
+                <a16:creationId xmlns:a16="http://schemas.microsoft.com/office/drawing/2014/main" id="{A143064D-45EC-0A4F-88C5-9640D09D7651}"/>
               </a:ext>
             </a:extLst>
           </p:cNvPr>
@@ -9815,7 +9815,7 @@
             <a:fld id="{22DD8F49-BF83-0E4D-8954-2DA98C3220A2}" type="datetime6">
               <a:rPr lang="fr-FR" smtClean="0"/>
               <a:pPr/>
-              <a:t>avril 22</a:t>
+              <a:t>août 23</a:t>
             </a:fld>
             <a:endParaRPr lang="en-US" dirty="0"/>
           </a:p>
@@ -9868,7 +9868,7 @@
           <p:cNvPr id="8" name="Rectangle 7">
             <a:extLst>
               <a:ext uri="{FF2B5EF4-FFF2-40B4-BE49-F238E27FC236}">
-                <a16:creationId xmlns="" xmlns:a16="http://schemas.microsoft.com/office/drawing/2014/main" id="{6524FE37-B1D2-9A48-8EE1-B9816DBDEF3D}"/>
+                <a16:creationId xmlns:a16="http://schemas.microsoft.com/office/drawing/2014/main" id="{6524FE37-B1D2-9A48-8EE1-B9816DBDEF3D}"/>
               </a:ext>
             </a:extLst>
           </p:cNvPr>
@@ -9907,7 +9907,7 @@
           <p:cNvPr id="9" name="TextBox 8">
             <a:extLst>
               <a:ext uri="{FF2B5EF4-FFF2-40B4-BE49-F238E27FC236}">
-                <a16:creationId xmlns="" xmlns:a16="http://schemas.microsoft.com/office/drawing/2014/main" id="{46ADA988-EDE2-EB43-9964-F5CB85382BA1}"/>
+                <a16:creationId xmlns:a16="http://schemas.microsoft.com/office/drawing/2014/main" id="{46ADA988-EDE2-EB43-9964-F5CB85382BA1}"/>
               </a:ext>
             </a:extLst>
           </p:cNvPr>
@@ -10146,7 +10146,7 @@
           <p:cNvPr id="12" name="Straight Connector 11">
             <a:extLst>
               <a:ext uri="{FF2B5EF4-FFF2-40B4-BE49-F238E27FC236}">
-                <a16:creationId xmlns="" xmlns:a16="http://schemas.microsoft.com/office/drawing/2014/main" id="{80782101-745C-B64C-BF8C-0612C8A826F4}"/>
+                <a16:creationId xmlns:a16="http://schemas.microsoft.com/office/drawing/2014/main" id="{80782101-745C-B64C-BF8C-0612C8A826F4}"/>
               </a:ext>
             </a:extLst>
           </p:cNvPr>
@@ -10248,7 +10248,7 @@
             <a:fld id="{22DD8F49-BF83-0E4D-8954-2DA98C3220A2}" type="datetime6">
               <a:rPr lang="fr-FR" smtClean="0"/>
               <a:pPr/>
-              <a:t>avril 22</a:t>
+              <a:t>août 23</a:t>
             </a:fld>
             <a:endParaRPr lang="en-US" dirty="0"/>
           </a:p>
@@ -10304,7 +10304,7 @@
           <p:cNvPr id="11" name="Rectangle 10">
             <a:extLst>
               <a:ext uri="{FF2B5EF4-FFF2-40B4-BE49-F238E27FC236}">
-                <a16:creationId xmlns="" xmlns:a16="http://schemas.microsoft.com/office/drawing/2014/main" id="{1A60FEF2-2730-8045-B797-AEA6DA2ED07B}"/>
+                <a16:creationId xmlns:a16="http://schemas.microsoft.com/office/drawing/2014/main" id="{1A60FEF2-2730-8045-B797-AEA6DA2ED07B}"/>
               </a:ext>
             </a:extLst>
           </p:cNvPr>
@@ -10340,7 +10340,7 @@
           <p:cNvPr id="12" name="Straight Connector 11">
             <a:extLst>
               <a:ext uri="{FF2B5EF4-FFF2-40B4-BE49-F238E27FC236}">
-                <a16:creationId xmlns="" xmlns:a16="http://schemas.microsoft.com/office/drawing/2014/main" id="{9FC44B9B-3ED3-CD4D-A4B4-670F9A0707A7}"/>
+                <a16:creationId xmlns:a16="http://schemas.microsoft.com/office/drawing/2014/main" id="{9FC44B9B-3ED3-CD4D-A4B4-670F9A0707A7}"/>
               </a:ext>
             </a:extLst>
           </p:cNvPr>
@@ -10376,7 +10376,7 @@
           <p:cNvPr id="13" name="Rectangle 12">
             <a:extLst>
               <a:ext uri="{FF2B5EF4-FFF2-40B4-BE49-F238E27FC236}">
-                <a16:creationId xmlns="" xmlns:a16="http://schemas.microsoft.com/office/drawing/2014/main" id="{A8E9047D-CEE7-1041-9CD2-438580517A8B}"/>
+                <a16:creationId xmlns:a16="http://schemas.microsoft.com/office/drawing/2014/main" id="{A8E9047D-CEE7-1041-9CD2-438580517A8B}"/>
               </a:ext>
             </a:extLst>
           </p:cNvPr>
@@ -10412,7 +10412,7 @@
           <p:cNvPr id="14" name="Straight Connector 13">
             <a:extLst>
               <a:ext uri="{FF2B5EF4-FFF2-40B4-BE49-F238E27FC236}">
-                <a16:creationId xmlns="" xmlns:a16="http://schemas.microsoft.com/office/drawing/2014/main" id="{A080B88E-5B35-9C42-B51A-25732C333881}"/>
+                <a16:creationId xmlns:a16="http://schemas.microsoft.com/office/drawing/2014/main" id="{A080B88E-5B35-9C42-B51A-25732C333881}"/>
               </a:ext>
             </a:extLst>
           </p:cNvPr>
@@ -10448,7 +10448,7 @@
           <p:cNvPr id="16" name="TextBox 15">
             <a:extLst>
               <a:ext uri="{FF2B5EF4-FFF2-40B4-BE49-F238E27FC236}">
-                <a16:creationId xmlns="" xmlns:a16="http://schemas.microsoft.com/office/drawing/2014/main" id="{B2BB3227-C774-FD42-B9A5-3508452E6A71}"/>
+                <a16:creationId xmlns:a16="http://schemas.microsoft.com/office/drawing/2014/main" id="{B2BB3227-C774-FD42-B9A5-3508452E6A71}"/>
               </a:ext>
             </a:extLst>
           </p:cNvPr>
@@ -11135,7 +11135,7 @@
           <p:cNvPr id="86" name="Rectangle 85">
             <a:extLst>
               <a:ext uri="{FF2B5EF4-FFF2-40B4-BE49-F238E27FC236}">
-                <a16:creationId xmlns="" xmlns:a16="http://schemas.microsoft.com/office/drawing/2014/main" id="{EDB109D6-5BF6-5E42-A1C1-45B238B41A7E}"/>
+                <a16:creationId xmlns:a16="http://schemas.microsoft.com/office/drawing/2014/main" id="{EDB109D6-5BF6-5E42-A1C1-45B238B41A7E}"/>
               </a:ext>
             </a:extLst>
           </p:cNvPr>
@@ -11197,7 +11197,7 @@
           <p:cNvPr id="45" name="Rectangle 1">
             <a:extLst>
               <a:ext uri="{FF2B5EF4-FFF2-40B4-BE49-F238E27FC236}">
-                <a16:creationId xmlns="" xmlns:a16="http://schemas.microsoft.com/office/drawing/2014/main" id="{7F24C5F6-F280-EE49-BEC1-D93D2617D356}"/>
+                <a16:creationId xmlns:a16="http://schemas.microsoft.com/office/drawing/2014/main" id="{7F24C5F6-F280-EE49-BEC1-D93D2617D356}"/>
               </a:ext>
             </a:extLst>
           </p:cNvPr>
@@ -11446,7 +11446,7 @@
           <p:cNvPr id="89" name="Rectangle 88">
             <a:extLst>
               <a:ext uri="{FF2B5EF4-FFF2-40B4-BE49-F238E27FC236}">
-                <a16:creationId xmlns="" xmlns:a16="http://schemas.microsoft.com/office/drawing/2014/main" id="{EFCB9C4D-5246-B743-853A-FA66CEE7DE4D}"/>
+                <a16:creationId xmlns:a16="http://schemas.microsoft.com/office/drawing/2014/main" id="{EFCB9C4D-5246-B743-853A-FA66CEE7DE4D}"/>
               </a:ext>
             </a:extLst>
           </p:cNvPr>
@@ -11498,7 +11498,7 @@
           <p:cNvPr id="93" name="Triangle 92">
             <a:extLst>
               <a:ext uri="{FF2B5EF4-FFF2-40B4-BE49-F238E27FC236}">
-                <a16:creationId xmlns="" xmlns:a16="http://schemas.microsoft.com/office/drawing/2014/main" id="{0D72A147-C32E-C540-8F80-59F865637BB1}"/>
+                <a16:creationId xmlns:a16="http://schemas.microsoft.com/office/drawing/2014/main" id="{0D72A147-C32E-C540-8F80-59F865637BB1}"/>
               </a:ext>
             </a:extLst>
           </p:cNvPr>
@@ -11553,7 +11553,7 @@
             <a:hlinkClick r:id="rId2"/>
             <a:extLst>
               <a:ext uri="{FF2B5EF4-FFF2-40B4-BE49-F238E27FC236}">
-                <a16:creationId xmlns="" xmlns:a16="http://schemas.microsoft.com/office/drawing/2014/main" id="{0A03D419-B4E4-A341-8258-BAF4FC5373B4}"/>
+                <a16:creationId xmlns:a16="http://schemas.microsoft.com/office/drawing/2014/main" id="{0A03D419-B4E4-A341-8258-BAF4FC5373B4}"/>
               </a:ext>
             </a:extLst>
           </p:cNvPr>
@@ -11616,7 +11616,7 @@
           <p:cNvPr id="95" name="Group 94">
             <a:extLst>
               <a:ext uri="{FF2B5EF4-FFF2-40B4-BE49-F238E27FC236}">
-                <a16:creationId xmlns="" xmlns:a16="http://schemas.microsoft.com/office/drawing/2014/main" id="{89E75E57-B1BB-1043-92B1-2837059A39CF}"/>
+                <a16:creationId xmlns:a16="http://schemas.microsoft.com/office/drawing/2014/main" id="{89E75E57-B1BB-1043-92B1-2837059A39CF}"/>
               </a:ext>
             </a:extLst>
           </p:cNvPr>
@@ -11636,7 +11636,7 @@
             <p:cNvPr id="96" name="Rounded Rectangle 95">
               <a:extLst>
                 <a:ext uri="{FF2B5EF4-FFF2-40B4-BE49-F238E27FC236}">
-                  <a16:creationId xmlns="" xmlns:a16="http://schemas.microsoft.com/office/drawing/2014/main" id="{C571F53C-F9A8-D34F-89E9-D59834F26F2A}"/>
+                  <a16:creationId xmlns:a16="http://schemas.microsoft.com/office/drawing/2014/main" id="{C571F53C-F9A8-D34F-89E9-D59834F26F2A}"/>
                 </a:ext>
               </a:extLst>
             </p:cNvPr>
@@ -11689,7 +11689,7 @@
               <a:hlinkClick r:id="rId3"/>
               <a:extLst>
                 <a:ext uri="{FF2B5EF4-FFF2-40B4-BE49-F238E27FC236}">
-                  <a16:creationId xmlns="" xmlns:a16="http://schemas.microsoft.com/office/drawing/2014/main" id="{BCCC18FD-7037-504F-B7DD-009E93D5CFC5}"/>
+                  <a16:creationId xmlns:a16="http://schemas.microsoft.com/office/drawing/2014/main" id="{BCCC18FD-7037-504F-B7DD-009E93D5CFC5}"/>
                 </a:ext>
               </a:extLst>
             </p:cNvPr>
@@ -11741,7 +11741,7 @@
             <a:hlinkClick r:id="rId3"/>
             <a:extLst>
               <a:ext uri="{FF2B5EF4-FFF2-40B4-BE49-F238E27FC236}">
-                <a16:creationId xmlns="" xmlns:a16="http://schemas.microsoft.com/office/drawing/2014/main" id="{31AA4A0D-C979-ED41-9053-191689A53F33}"/>
+                <a16:creationId xmlns:a16="http://schemas.microsoft.com/office/drawing/2014/main" id="{31AA4A0D-C979-ED41-9053-191689A53F33}"/>
               </a:ext>
             </a:extLst>
           </p:cNvPr>
@@ -11804,7 +11804,7 @@
           <p:cNvPr id="105" name="Group 104">
             <a:extLst>
               <a:ext uri="{FF2B5EF4-FFF2-40B4-BE49-F238E27FC236}">
-                <a16:creationId xmlns="" xmlns:a16="http://schemas.microsoft.com/office/drawing/2014/main" id="{7BF00640-0851-4A4E-8179-1BD384D8F525}"/>
+                <a16:creationId xmlns:a16="http://schemas.microsoft.com/office/drawing/2014/main" id="{7BF00640-0851-4A4E-8179-1BD384D8F525}"/>
               </a:ext>
             </a:extLst>
           </p:cNvPr>
@@ -11824,7 +11824,7 @@
             <p:cNvPr id="106" name="Rounded Rectangle 105">
               <a:extLst>
                 <a:ext uri="{FF2B5EF4-FFF2-40B4-BE49-F238E27FC236}">
-                  <a16:creationId xmlns="" xmlns:a16="http://schemas.microsoft.com/office/drawing/2014/main" id="{5AA2B150-5004-364C-910A-A392CD7A853A}"/>
+                  <a16:creationId xmlns:a16="http://schemas.microsoft.com/office/drawing/2014/main" id="{5AA2B150-5004-364C-910A-A392CD7A853A}"/>
                 </a:ext>
               </a:extLst>
             </p:cNvPr>
@@ -11877,7 +11877,7 @@
               <a:hlinkClick r:id="rId3"/>
               <a:extLst>
                 <a:ext uri="{FF2B5EF4-FFF2-40B4-BE49-F238E27FC236}">
-                  <a16:creationId xmlns="" xmlns:a16="http://schemas.microsoft.com/office/drawing/2014/main" id="{91AD4506-A6D6-124C-97E7-7D3DF0EBA900}"/>
+                  <a16:creationId xmlns:a16="http://schemas.microsoft.com/office/drawing/2014/main" id="{91AD4506-A6D6-124C-97E7-7D3DF0EBA900}"/>
                 </a:ext>
               </a:extLst>
             </p:cNvPr>
@@ -11936,7 +11936,7 @@
           <p:cNvPr id="122" name="Picture 121">
             <a:extLst>
               <a:ext uri="{FF2B5EF4-FFF2-40B4-BE49-F238E27FC236}">
-                <a16:creationId xmlns="" xmlns:a16="http://schemas.microsoft.com/office/drawing/2014/main" id="{B221A555-3C2F-E94D-96E4-6FC85564B891}"/>
+                <a16:creationId xmlns:a16="http://schemas.microsoft.com/office/drawing/2014/main" id="{B221A555-3C2F-E94D-96E4-6FC85564B891}"/>
               </a:ext>
             </a:extLst>
           </p:cNvPr>
@@ -11972,7 +11972,7 @@
           <p:cNvPr id="129" name="Title 24">
             <a:extLst>
               <a:ext uri="{FF2B5EF4-FFF2-40B4-BE49-F238E27FC236}">
-                <a16:creationId xmlns="" xmlns:a16="http://schemas.microsoft.com/office/drawing/2014/main" id="{C9C5C095-FA83-CE44-8BA2-FB0F4CF430D7}"/>
+                <a16:creationId xmlns:a16="http://schemas.microsoft.com/office/drawing/2014/main" id="{C9C5C095-FA83-CE44-8BA2-FB0F4CF430D7}"/>
               </a:ext>
             </a:extLst>
           </p:cNvPr>
@@ -12032,7 +12032,7 @@
           <p:cNvPr id="134" name="Picture 133">
             <a:extLst>
               <a:ext uri="{FF2B5EF4-FFF2-40B4-BE49-F238E27FC236}">
-                <a16:creationId xmlns="" xmlns:a16="http://schemas.microsoft.com/office/drawing/2014/main" id="{0E8E09F9-EF0B-4C47-B695-BE4EBAFCE677}"/>
+                <a16:creationId xmlns:a16="http://schemas.microsoft.com/office/drawing/2014/main" id="{0E8E09F9-EF0B-4C47-B695-BE4EBAFCE677}"/>
               </a:ext>
             </a:extLst>
           </p:cNvPr>
@@ -12067,7 +12067,7 @@
           <p:cNvPr id="135" name="Straight Connector 134">
             <a:extLst>
               <a:ext uri="{FF2B5EF4-FFF2-40B4-BE49-F238E27FC236}">
-                <a16:creationId xmlns="" xmlns:a16="http://schemas.microsoft.com/office/drawing/2014/main" id="{FF6AB179-2926-4D40-A4DD-8BB1E9EAEA7D}"/>
+                <a16:creationId xmlns:a16="http://schemas.microsoft.com/office/drawing/2014/main" id="{FF6AB179-2926-4D40-A4DD-8BB1E9EAEA7D}"/>
               </a:ext>
             </a:extLst>
           </p:cNvPr>
@@ -12108,7 +12108,7 @@
           <p:cNvPr id="41" name="Content Placeholder 52">
             <a:extLst>
               <a:ext uri="{FF2B5EF4-FFF2-40B4-BE49-F238E27FC236}">
-                <a16:creationId xmlns="" xmlns:a16="http://schemas.microsoft.com/office/drawing/2014/main" id="{03870E7E-5F8D-F64D-B6CF-AC70B18948A2}"/>
+                <a16:creationId xmlns:a16="http://schemas.microsoft.com/office/drawing/2014/main" id="{03870E7E-5F8D-F64D-B6CF-AC70B18948A2}"/>
               </a:ext>
             </a:extLst>
           </p:cNvPr>
@@ -12358,7 +12358,7 @@
           <p:cNvPr id="42" name="Content Placeholder 52">
             <a:extLst>
               <a:ext uri="{FF2B5EF4-FFF2-40B4-BE49-F238E27FC236}">
-                <a16:creationId xmlns="" xmlns:a16="http://schemas.microsoft.com/office/drawing/2014/main" id="{95FE5B9D-9272-3841-9EE5-9D5A046A1FF7}"/>
+                <a16:creationId xmlns:a16="http://schemas.microsoft.com/office/drawing/2014/main" id="{95FE5B9D-9272-3841-9EE5-9D5A046A1FF7}"/>
               </a:ext>
             </a:extLst>
           </p:cNvPr>
@@ -12594,7 +12594,7 @@
           <p:cNvPr id="43" name="Content Placeholder 52">
             <a:extLst>
               <a:ext uri="{FF2B5EF4-FFF2-40B4-BE49-F238E27FC236}">
-                <a16:creationId xmlns="" xmlns:a16="http://schemas.microsoft.com/office/drawing/2014/main" id="{8C3392A2-7BEC-C643-A397-ACB0C15BDDE1}"/>
+                <a16:creationId xmlns:a16="http://schemas.microsoft.com/office/drawing/2014/main" id="{8C3392A2-7BEC-C643-A397-ACB0C15BDDE1}"/>
               </a:ext>
             </a:extLst>
           </p:cNvPr>
@@ -12829,7 +12829,7 @@
           <p:cNvPr id="44" name="Content Placeholder 52">
             <a:extLst>
               <a:ext uri="{FF2B5EF4-FFF2-40B4-BE49-F238E27FC236}">
-                <a16:creationId xmlns="" xmlns:a16="http://schemas.microsoft.com/office/drawing/2014/main" id="{5BF202D4-4239-7E4F-93CD-8E57B0E44847}"/>
+                <a16:creationId xmlns:a16="http://schemas.microsoft.com/office/drawing/2014/main" id="{5BF202D4-4239-7E4F-93CD-8E57B0E44847}"/>
               </a:ext>
             </a:extLst>
           </p:cNvPr>
@@ -13031,16 +13031,6 @@
               </a:rPr>
               <a:t> CHINA</a:t>
             </a:r>
-            <a:r>
-              <a:rPr lang="en-US" sz="1158" spc="30" dirty="0">
-                <a:solidFill>
-                  <a:schemeClr val="bg1"/>
-                </a:solidFill>
-                <a:latin typeface="Source Sans Pro Light" panose="020B0403030403020204" pitchFamily="34" charset="77"/>
-                <a:ea typeface="Source Sans Pro" panose="020B0503030403020204" pitchFamily="34" charset="0"/>
-              </a:rPr>
-              <a:t/>
-            </a:r>
             <a:br>
               <a:rPr lang="en-US" sz="1158" spc="30" dirty="0">
                 <a:solidFill>
@@ -13073,7 +13063,7 @@
           <p:cNvPr id="46" name="Content Placeholder 52">
             <a:extLst>
               <a:ext uri="{FF2B5EF4-FFF2-40B4-BE49-F238E27FC236}">
-                <a16:creationId xmlns="" xmlns:a16="http://schemas.microsoft.com/office/drawing/2014/main" id="{16FDB233-B738-8D4E-B43F-750A1A983DE9}"/>
+                <a16:creationId xmlns:a16="http://schemas.microsoft.com/office/drawing/2014/main" id="{16FDB233-B738-8D4E-B43F-750A1A983DE9}"/>
               </a:ext>
             </a:extLst>
           </p:cNvPr>
@@ -13309,7 +13299,7 @@
           <p:cNvPr id="47" name="Picture 46">
             <a:extLst>
               <a:ext uri="{FF2B5EF4-FFF2-40B4-BE49-F238E27FC236}">
-                <a16:creationId xmlns="" xmlns:a16="http://schemas.microsoft.com/office/drawing/2014/main" id="{E394D0E0-025D-644F-82A2-ED215AC1B381}"/>
+                <a16:creationId xmlns:a16="http://schemas.microsoft.com/office/drawing/2014/main" id="{E394D0E0-025D-644F-82A2-ED215AC1B381}"/>
               </a:ext>
             </a:extLst>
           </p:cNvPr>
@@ -13345,7 +13335,7 @@
           <p:cNvPr id="48" name="Picture 47">
             <a:extLst>
               <a:ext uri="{FF2B5EF4-FFF2-40B4-BE49-F238E27FC236}">
-                <a16:creationId xmlns="" xmlns:a16="http://schemas.microsoft.com/office/drawing/2014/main" id="{35E0AA7F-0EA4-224A-92F8-C9A9D5B1B802}"/>
+                <a16:creationId xmlns:a16="http://schemas.microsoft.com/office/drawing/2014/main" id="{35E0AA7F-0EA4-224A-92F8-C9A9D5B1B802}"/>
               </a:ext>
             </a:extLst>
           </p:cNvPr>
@@ -13381,7 +13371,7 @@
           <p:cNvPr id="49" name="Picture 48">
             <a:extLst>
               <a:ext uri="{FF2B5EF4-FFF2-40B4-BE49-F238E27FC236}">
-                <a16:creationId xmlns="" xmlns:a16="http://schemas.microsoft.com/office/drawing/2014/main" id="{A48092AC-915B-524D-9672-FE0826E130E7}"/>
+                <a16:creationId xmlns:a16="http://schemas.microsoft.com/office/drawing/2014/main" id="{A48092AC-915B-524D-9672-FE0826E130E7}"/>
               </a:ext>
             </a:extLst>
           </p:cNvPr>
@@ -13417,7 +13407,7 @@
           <p:cNvPr id="51" name="Picture 50">
             <a:extLst>
               <a:ext uri="{FF2B5EF4-FFF2-40B4-BE49-F238E27FC236}">
-                <a16:creationId xmlns="" xmlns:a16="http://schemas.microsoft.com/office/drawing/2014/main" id="{27E440A9-1FB1-A44A-8917-F3A839BAF906}"/>
+                <a16:creationId xmlns:a16="http://schemas.microsoft.com/office/drawing/2014/main" id="{27E440A9-1FB1-A44A-8917-F3A839BAF906}"/>
               </a:ext>
             </a:extLst>
           </p:cNvPr>
@@ -13453,7 +13443,7 @@
           <p:cNvPr id="52" name="Picture 51">
             <a:extLst>
               <a:ext uri="{FF2B5EF4-FFF2-40B4-BE49-F238E27FC236}">
-                <a16:creationId xmlns="" xmlns:a16="http://schemas.microsoft.com/office/drawing/2014/main" id="{FFFF220F-F683-2F48-A73D-6A41401B0D05}"/>
+                <a16:creationId xmlns:a16="http://schemas.microsoft.com/office/drawing/2014/main" id="{FFFF220F-F683-2F48-A73D-6A41401B0D05}"/>
               </a:ext>
             </a:extLst>
           </p:cNvPr>
@@ -13489,7 +13479,7 @@
           <p:cNvPr id="53" name="Picture 52">
             <a:extLst>
               <a:ext uri="{FF2B5EF4-FFF2-40B4-BE49-F238E27FC236}">
-                <a16:creationId xmlns="" xmlns:a16="http://schemas.microsoft.com/office/drawing/2014/main" id="{FC96BF3C-2C18-7E4E-AADA-8075C799317A}"/>
+                <a16:creationId xmlns:a16="http://schemas.microsoft.com/office/drawing/2014/main" id="{FC96BF3C-2C18-7E4E-AADA-8075C799317A}"/>
               </a:ext>
             </a:extLst>
           </p:cNvPr>
@@ -13525,7 +13515,7 @@
           <p:cNvPr id="54" name="Content Placeholder 52">
             <a:extLst>
               <a:ext uri="{FF2B5EF4-FFF2-40B4-BE49-F238E27FC236}">
-                <a16:creationId xmlns="" xmlns:a16="http://schemas.microsoft.com/office/drawing/2014/main" id="{8184E9DC-A05F-994B-8D0E-6F0964DE93A1}"/>
+                <a16:creationId xmlns:a16="http://schemas.microsoft.com/office/drawing/2014/main" id="{8184E9DC-A05F-994B-8D0E-6F0964DE93A1}"/>
               </a:ext>
             </a:extLst>
           </p:cNvPr>
@@ -13739,18 +13729,6 @@
               </a:rPr>
               <a:t>GERMANY</a:t>
             </a:r>
-            <a:r>
-              <a:rPr lang="en-US" sz="1158" b="1" i="0" kern="1200" spc="10" dirty="0">
-                <a:solidFill>
-                  <a:schemeClr val="bg1"/>
-                </a:solidFill>
-                <a:effectLst/>
-                <a:latin typeface="Brandon Grotesque Black" charset="0"/>
-                <a:ea typeface="Brandon Grotesque Black" charset="0"/>
-                <a:cs typeface="Brandon Grotesque Black" charset="0"/>
-              </a:rPr>
-              <a:t/>
-            </a:r>
             <a:br>
               <a:rPr lang="en-US" sz="1158" b="1" i="0" kern="1200" spc="10" dirty="0">
                 <a:solidFill>
@@ -13790,7 +13768,7 @@
           <p:cNvPr id="37" name="Content Placeholder 52">
             <a:extLst>
               <a:ext uri="{FF2B5EF4-FFF2-40B4-BE49-F238E27FC236}">
-                <a16:creationId xmlns="" xmlns:a16="http://schemas.microsoft.com/office/drawing/2014/main" id="{A1F29D74-7F07-D84E-B102-930FD141E5B9}"/>
+                <a16:creationId xmlns:a16="http://schemas.microsoft.com/office/drawing/2014/main" id="{A1F29D74-7F07-D84E-B102-930FD141E5B9}"/>
               </a:ext>
             </a:extLst>
           </p:cNvPr>
@@ -14026,7 +14004,7 @@
           <p:cNvPr id="38" name="Picture 37">
             <a:extLst>
               <a:ext uri="{FF2B5EF4-FFF2-40B4-BE49-F238E27FC236}">
-                <a16:creationId xmlns="" xmlns:a16="http://schemas.microsoft.com/office/drawing/2014/main" id="{B4EE7BA3-3882-054B-9C71-4C6C9D45BBC3}"/>
+                <a16:creationId xmlns:a16="http://schemas.microsoft.com/office/drawing/2014/main" id="{B4EE7BA3-3882-054B-9C71-4C6C9D45BBC3}"/>
               </a:ext>
             </a:extLst>
           </p:cNvPr>
@@ -14063,7 +14041,7 @@
             <a:hlinkClick r:id="rId3"/>
             <a:extLst>
               <a:ext uri="{FF2B5EF4-FFF2-40B4-BE49-F238E27FC236}">
-                <a16:creationId xmlns="" xmlns:a16="http://schemas.microsoft.com/office/drawing/2014/main" id="{8ECC0D63-20D7-0343-86D0-A87AE2BB8F87}"/>
+                <a16:creationId xmlns:a16="http://schemas.microsoft.com/office/drawing/2014/main" id="{8ECC0D63-20D7-0343-86D0-A87AE2BB8F87}"/>
               </a:ext>
             </a:extLst>
           </p:cNvPr>
@@ -14122,7 +14100,7 @@
             <a:hlinkClick r:id="rId2"/>
             <a:extLst>
               <a:ext uri="{FF2B5EF4-FFF2-40B4-BE49-F238E27FC236}">
-                <a16:creationId xmlns="" xmlns:a16="http://schemas.microsoft.com/office/drawing/2014/main" id="{B01DB6F7-4A56-E648-8CE4-FB8C132141F4}"/>
+                <a16:creationId xmlns:a16="http://schemas.microsoft.com/office/drawing/2014/main" id="{B01DB6F7-4A56-E648-8CE4-FB8C132141F4}"/>
               </a:ext>
             </a:extLst>
           </p:cNvPr>
@@ -14211,7 +14189,7 @@
           <p:cNvPr id="86" name="Rectangle 85">
             <a:extLst>
               <a:ext uri="{FF2B5EF4-FFF2-40B4-BE49-F238E27FC236}">
-                <a16:creationId xmlns="" xmlns:a16="http://schemas.microsoft.com/office/drawing/2014/main" id="{EDB109D6-5BF6-5E42-A1C1-45B238B41A7E}"/>
+                <a16:creationId xmlns:a16="http://schemas.microsoft.com/office/drawing/2014/main" id="{EDB109D6-5BF6-5E42-A1C1-45B238B41A7E}"/>
               </a:ext>
             </a:extLst>
           </p:cNvPr>
@@ -14273,7 +14251,7 @@
           <p:cNvPr id="131" name="Rectangle 1">
             <a:extLst>
               <a:ext uri="{FF2B5EF4-FFF2-40B4-BE49-F238E27FC236}">
-                <a16:creationId xmlns="" xmlns:a16="http://schemas.microsoft.com/office/drawing/2014/main" id="{D03E41E1-380E-DF4A-8F15-AB2EAE2322B9}"/>
+                <a16:creationId xmlns:a16="http://schemas.microsoft.com/office/drawing/2014/main" id="{D03E41E1-380E-DF4A-8F15-AB2EAE2322B9}"/>
               </a:ext>
             </a:extLst>
           </p:cNvPr>
@@ -14522,7 +14500,7 @@
           <p:cNvPr id="89" name="Rectangle 88">
             <a:extLst>
               <a:ext uri="{FF2B5EF4-FFF2-40B4-BE49-F238E27FC236}">
-                <a16:creationId xmlns="" xmlns:a16="http://schemas.microsoft.com/office/drawing/2014/main" id="{EFCB9C4D-5246-B743-853A-FA66CEE7DE4D}"/>
+                <a16:creationId xmlns:a16="http://schemas.microsoft.com/office/drawing/2014/main" id="{EFCB9C4D-5246-B743-853A-FA66CEE7DE4D}"/>
               </a:ext>
             </a:extLst>
           </p:cNvPr>
@@ -14574,7 +14552,7 @@
           <p:cNvPr id="93" name="Triangle 92">
             <a:extLst>
               <a:ext uri="{FF2B5EF4-FFF2-40B4-BE49-F238E27FC236}">
-                <a16:creationId xmlns="" xmlns:a16="http://schemas.microsoft.com/office/drawing/2014/main" id="{0D72A147-C32E-C540-8F80-59F865637BB1}"/>
+                <a16:creationId xmlns:a16="http://schemas.microsoft.com/office/drawing/2014/main" id="{0D72A147-C32E-C540-8F80-59F865637BB1}"/>
               </a:ext>
             </a:extLst>
           </p:cNvPr>
@@ -14629,7 +14607,7 @@
             <a:hlinkClick r:id="rId2"/>
             <a:extLst>
               <a:ext uri="{FF2B5EF4-FFF2-40B4-BE49-F238E27FC236}">
-                <a16:creationId xmlns="" xmlns:a16="http://schemas.microsoft.com/office/drawing/2014/main" id="{0A03D419-B4E4-A341-8258-BAF4FC5373B4}"/>
+                <a16:creationId xmlns:a16="http://schemas.microsoft.com/office/drawing/2014/main" id="{0A03D419-B4E4-A341-8258-BAF4FC5373B4}"/>
               </a:ext>
             </a:extLst>
           </p:cNvPr>
@@ -14692,7 +14670,7 @@
           <p:cNvPr id="95" name="Group 94">
             <a:extLst>
               <a:ext uri="{FF2B5EF4-FFF2-40B4-BE49-F238E27FC236}">
-                <a16:creationId xmlns="" xmlns:a16="http://schemas.microsoft.com/office/drawing/2014/main" id="{89E75E57-B1BB-1043-92B1-2837059A39CF}"/>
+                <a16:creationId xmlns:a16="http://schemas.microsoft.com/office/drawing/2014/main" id="{89E75E57-B1BB-1043-92B1-2837059A39CF}"/>
               </a:ext>
             </a:extLst>
           </p:cNvPr>
@@ -14712,7 +14690,7 @@
             <p:cNvPr id="96" name="Rounded Rectangle 95">
               <a:extLst>
                 <a:ext uri="{FF2B5EF4-FFF2-40B4-BE49-F238E27FC236}">
-                  <a16:creationId xmlns="" xmlns:a16="http://schemas.microsoft.com/office/drawing/2014/main" id="{C571F53C-F9A8-D34F-89E9-D59834F26F2A}"/>
+                  <a16:creationId xmlns:a16="http://schemas.microsoft.com/office/drawing/2014/main" id="{C571F53C-F9A8-D34F-89E9-D59834F26F2A}"/>
                 </a:ext>
               </a:extLst>
             </p:cNvPr>
@@ -14765,7 +14743,7 @@
               <a:hlinkClick r:id="rId3"/>
               <a:extLst>
                 <a:ext uri="{FF2B5EF4-FFF2-40B4-BE49-F238E27FC236}">
-                  <a16:creationId xmlns="" xmlns:a16="http://schemas.microsoft.com/office/drawing/2014/main" id="{BCCC18FD-7037-504F-B7DD-009E93D5CFC5}"/>
+                  <a16:creationId xmlns:a16="http://schemas.microsoft.com/office/drawing/2014/main" id="{BCCC18FD-7037-504F-B7DD-009E93D5CFC5}"/>
                 </a:ext>
               </a:extLst>
             </p:cNvPr>
@@ -14817,7 +14795,7 @@
             <a:hlinkClick r:id="rId3"/>
             <a:extLst>
               <a:ext uri="{FF2B5EF4-FFF2-40B4-BE49-F238E27FC236}">
-                <a16:creationId xmlns="" xmlns:a16="http://schemas.microsoft.com/office/drawing/2014/main" id="{31AA4A0D-C979-ED41-9053-191689A53F33}"/>
+                <a16:creationId xmlns:a16="http://schemas.microsoft.com/office/drawing/2014/main" id="{31AA4A0D-C979-ED41-9053-191689A53F33}"/>
               </a:ext>
             </a:extLst>
           </p:cNvPr>
@@ -14880,7 +14858,7 @@
           <p:cNvPr id="105" name="Group 104">
             <a:extLst>
               <a:ext uri="{FF2B5EF4-FFF2-40B4-BE49-F238E27FC236}">
-                <a16:creationId xmlns="" xmlns:a16="http://schemas.microsoft.com/office/drawing/2014/main" id="{7BF00640-0851-4A4E-8179-1BD384D8F525}"/>
+                <a16:creationId xmlns:a16="http://schemas.microsoft.com/office/drawing/2014/main" id="{7BF00640-0851-4A4E-8179-1BD384D8F525}"/>
               </a:ext>
             </a:extLst>
           </p:cNvPr>
@@ -14900,7 +14878,7 @@
             <p:cNvPr id="106" name="Rounded Rectangle 105">
               <a:extLst>
                 <a:ext uri="{FF2B5EF4-FFF2-40B4-BE49-F238E27FC236}">
-                  <a16:creationId xmlns="" xmlns:a16="http://schemas.microsoft.com/office/drawing/2014/main" id="{5AA2B150-5004-364C-910A-A392CD7A853A}"/>
+                  <a16:creationId xmlns:a16="http://schemas.microsoft.com/office/drawing/2014/main" id="{5AA2B150-5004-364C-910A-A392CD7A853A}"/>
                 </a:ext>
               </a:extLst>
             </p:cNvPr>
@@ -14953,7 +14931,7 @@
               <a:hlinkClick r:id="rId3"/>
               <a:extLst>
                 <a:ext uri="{FF2B5EF4-FFF2-40B4-BE49-F238E27FC236}">
-                  <a16:creationId xmlns="" xmlns:a16="http://schemas.microsoft.com/office/drawing/2014/main" id="{91AD4506-A6D6-124C-97E7-7D3DF0EBA900}"/>
+                  <a16:creationId xmlns:a16="http://schemas.microsoft.com/office/drawing/2014/main" id="{91AD4506-A6D6-124C-97E7-7D3DF0EBA900}"/>
                 </a:ext>
               </a:extLst>
             </p:cNvPr>
@@ -15012,7 +14990,7 @@
           <p:cNvPr id="122" name="Picture 121">
             <a:extLst>
               <a:ext uri="{FF2B5EF4-FFF2-40B4-BE49-F238E27FC236}">
-                <a16:creationId xmlns="" xmlns:a16="http://schemas.microsoft.com/office/drawing/2014/main" id="{B221A555-3C2F-E94D-96E4-6FC85564B891}"/>
+                <a16:creationId xmlns:a16="http://schemas.microsoft.com/office/drawing/2014/main" id="{B221A555-3C2F-E94D-96E4-6FC85564B891}"/>
               </a:ext>
             </a:extLst>
           </p:cNvPr>
@@ -15048,7 +15026,7 @@
           <p:cNvPr id="129" name="Title 24">
             <a:extLst>
               <a:ext uri="{FF2B5EF4-FFF2-40B4-BE49-F238E27FC236}">
-                <a16:creationId xmlns="" xmlns:a16="http://schemas.microsoft.com/office/drawing/2014/main" id="{C9C5C095-FA83-CE44-8BA2-FB0F4CF430D7}"/>
+                <a16:creationId xmlns:a16="http://schemas.microsoft.com/office/drawing/2014/main" id="{C9C5C095-FA83-CE44-8BA2-FB0F4CF430D7}"/>
               </a:ext>
             </a:extLst>
           </p:cNvPr>
@@ -15108,7 +15086,7 @@
           <p:cNvPr id="135" name="Straight Connector 134">
             <a:extLst>
               <a:ext uri="{FF2B5EF4-FFF2-40B4-BE49-F238E27FC236}">
-                <a16:creationId xmlns="" xmlns:a16="http://schemas.microsoft.com/office/drawing/2014/main" id="{FF6AB179-2926-4D40-A4DD-8BB1E9EAEA7D}"/>
+                <a16:creationId xmlns:a16="http://schemas.microsoft.com/office/drawing/2014/main" id="{FF6AB179-2926-4D40-A4DD-8BB1E9EAEA7D}"/>
               </a:ext>
             </a:extLst>
           </p:cNvPr>
@@ -15149,7 +15127,7 @@
           <p:cNvPr id="41" name="Content Placeholder 52">
             <a:extLst>
               <a:ext uri="{FF2B5EF4-FFF2-40B4-BE49-F238E27FC236}">
-                <a16:creationId xmlns="" xmlns:a16="http://schemas.microsoft.com/office/drawing/2014/main" id="{03870E7E-5F8D-F64D-B6CF-AC70B18948A2}"/>
+                <a16:creationId xmlns:a16="http://schemas.microsoft.com/office/drawing/2014/main" id="{03870E7E-5F8D-F64D-B6CF-AC70B18948A2}"/>
               </a:ext>
             </a:extLst>
           </p:cNvPr>
@@ -15399,7 +15377,7 @@
           <p:cNvPr id="42" name="Content Placeholder 52">
             <a:extLst>
               <a:ext uri="{FF2B5EF4-FFF2-40B4-BE49-F238E27FC236}">
-                <a16:creationId xmlns="" xmlns:a16="http://schemas.microsoft.com/office/drawing/2014/main" id="{95FE5B9D-9272-3841-9EE5-9D5A046A1FF7}"/>
+                <a16:creationId xmlns:a16="http://schemas.microsoft.com/office/drawing/2014/main" id="{95FE5B9D-9272-3841-9EE5-9D5A046A1FF7}"/>
               </a:ext>
             </a:extLst>
           </p:cNvPr>
@@ -15635,7 +15613,7 @@
           <p:cNvPr id="43" name="Content Placeholder 52">
             <a:extLst>
               <a:ext uri="{FF2B5EF4-FFF2-40B4-BE49-F238E27FC236}">
-                <a16:creationId xmlns="" xmlns:a16="http://schemas.microsoft.com/office/drawing/2014/main" id="{8C3392A2-7BEC-C643-A397-ACB0C15BDDE1}"/>
+                <a16:creationId xmlns:a16="http://schemas.microsoft.com/office/drawing/2014/main" id="{8C3392A2-7BEC-C643-A397-ACB0C15BDDE1}"/>
               </a:ext>
             </a:extLst>
           </p:cNvPr>
@@ -15870,7 +15848,7 @@
           <p:cNvPr id="44" name="Content Placeholder 52">
             <a:extLst>
               <a:ext uri="{FF2B5EF4-FFF2-40B4-BE49-F238E27FC236}">
-                <a16:creationId xmlns="" xmlns:a16="http://schemas.microsoft.com/office/drawing/2014/main" id="{5BF202D4-4239-7E4F-93CD-8E57B0E44847}"/>
+                <a16:creationId xmlns:a16="http://schemas.microsoft.com/office/drawing/2014/main" id="{5BF202D4-4239-7E4F-93CD-8E57B0E44847}"/>
               </a:ext>
             </a:extLst>
           </p:cNvPr>
@@ -16072,16 +16050,6 @@
               </a:rPr>
               <a:t> CHINA</a:t>
             </a:r>
-            <a:r>
-              <a:rPr lang="en-US" sz="1158" spc="30" dirty="0">
-                <a:solidFill>
-                  <a:schemeClr val="bg1"/>
-                </a:solidFill>
-                <a:latin typeface="Source Sans Pro Light" panose="020B0403030403020204" pitchFamily="34" charset="77"/>
-                <a:ea typeface="Source Sans Pro" panose="020B0503030403020204" pitchFamily="34" charset="0"/>
-              </a:rPr>
-              <a:t/>
-            </a:r>
             <a:br>
               <a:rPr lang="en-US" sz="1158" spc="30" dirty="0">
                 <a:solidFill>
@@ -16114,7 +16082,7 @@
           <p:cNvPr id="46" name="Content Placeholder 52">
             <a:extLst>
               <a:ext uri="{FF2B5EF4-FFF2-40B4-BE49-F238E27FC236}">
-                <a16:creationId xmlns="" xmlns:a16="http://schemas.microsoft.com/office/drawing/2014/main" id="{16FDB233-B738-8D4E-B43F-750A1A983DE9}"/>
+                <a16:creationId xmlns:a16="http://schemas.microsoft.com/office/drawing/2014/main" id="{16FDB233-B738-8D4E-B43F-750A1A983DE9}"/>
               </a:ext>
             </a:extLst>
           </p:cNvPr>
@@ -16350,7 +16318,7 @@
           <p:cNvPr id="47" name="Picture 46">
             <a:extLst>
               <a:ext uri="{FF2B5EF4-FFF2-40B4-BE49-F238E27FC236}">
-                <a16:creationId xmlns="" xmlns:a16="http://schemas.microsoft.com/office/drawing/2014/main" id="{E394D0E0-025D-644F-82A2-ED215AC1B381}"/>
+                <a16:creationId xmlns:a16="http://schemas.microsoft.com/office/drawing/2014/main" id="{E394D0E0-025D-644F-82A2-ED215AC1B381}"/>
               </a:ext>
             </a:extLst>
           </p:cNvPr>
@@ -16386,7 +16354,7 @@
           <p:cNvPr id="48" name="Picture 47">
             <a:extLst>
               <a:ext uri="{FF2B5EF4-FFF2-40B4-BE49-F238E27FC236}">
-                <a16:creationId xmlns="" xmlns:a16="http://schemas.microsoft.com/office/drawing/2014/main" id="{35E0AA7F-0EA4-224A-92F8-C9A9D5B1B802}"/>
+                <a16:creationId xmlns:a16="http://schemas.microsoft.com/office/drawing/2014/main" id="{35E0AA7F-0EA4-224A-92F8-C9A9D5B1B802}"/>
               </a:ext>
             </a:extLst>
           </p:cNvPr>
@@ -16422,7 +16390,7 @@
           <p:cNvPr id="49" name="Picture 48">
             <a:extLst>
               <a:ext uri="{FF2B5EF4-FFF2-40B4-BE49-F238E27FC236}">
-                <a16:creationId xmlns="" xmlns:a16="http://schemas.microsoft.com/office/drawing/2014/main" id="{A48092AC-915B-524D-9672-FE0826E130E7}"/>
+                <a16:creationId xmlns:a16="http://schemas.microsoft.com/office/drawing/2014/main" id="{A48092AC-915B-524D-9672-FE0826E130E7}"/>
               </a:ext>
             </a:extLst>
           </p:cNvPr>
@@ -16458,7 +16426,7 @@
           <p:cNvPr id="51" name="Picture 50">
             <a:extLst>
               <a:ext uri="{FF2B5EF4-FFF2-40B4-BE49-F238E27FC236}">
-                <a16:creationId xmlns="" xmlns:a16="http://schemas.microsoft.com/office/drawing/2014/main" id="{27E440A9-1FB1-A44A-8917-F3A839BAF906}"/>
+                <a16:creationId xmlns:a16="http://schemas.microsoft.com/office/drawing/2014/main" id="{27E440A9-1FB1-A44A-8917-F3A839BAF906}"/>
               </a:ext>
             </a:extLst>
           </p:cNvPr>
@@ -16494,7 +16462,7 @@
           <p:cNvPr id="52" name="Picture 51">
             <a:extLst>
               <a:ext uri="{FF2B5EF4-FFF2-40B4-BE49-F238E27FC236}">
-                <a16:creationId xmlns="" xmlns:a16="http://schemas.microsoft.com/office/drawing/2014/main" id="{FFFF220F-F683-2F48-A73D-6A41401B0D05}"/>
+                <a16:creationId xmlns:a16="http://schemas.microsoft.com/office/drawing/2014/main" id="{FFFF220F-F683-2F48-A73D-6A41401B0D05}"/>
               </a:ext>
             </a:extLst>
           </p:cNvPr>
@@ -16530,7 +16498,7 @@
           <p:cNvPr id="53" name="Picture 52">
             <a:extLst>
               <a:ext uri="{FF2B5EF4-FFF2-40B4-BE49-F238E27FC236}">
-                <a16:creationId xmlns="" xmlns:a16="http://schemas.microsoft.com/office/drawing/2014/main" id="{FC96BF3C-2C18-7E4E-AADA-8075C799317A}"/>
+                <a16:creationId xmlns:a16="http://schemas.microsoft.com/office/drawing/2014/main" id="{FC96BF3C-2C18-7E4E-AADA-8075C799317A}"/>
               </a:ext>
             </a:extLst>
           </p:cNvPr>
@@ -16566,7 +16534,7 @@
           <p:cNvPr id="54" name="Content Placeholder 52">
             <a:extLst>
               <a:ext uri="{FF2B5EF4-FFF2-40B4-BE49-F238E27FC236}">
-                <a16:creationId xmlns="" xmlns:a16="http://schemas.microsoft.com/office/drawing/2014/main" id="{8184E9DC-A05F-994B-8D0E-6F0964DE93A1}"/>
+                <a16:creationId xmlns:a16="http://schemas.microsoft.com/office/drawing/2014/main" id="{8184E9DC-A05F-994B-8D0E-6F0964DE93A1}"/>
               </a:ext>
             </a:extLst>
           </p:cNvPr>
@@ -16780,18 +16748,6 @@
               </a:rPr>
               <a:t>GERMANY</a:t>
             </a:r>
-            <a:r>
-              <a:rPr lang="en-US" sz="1158" b="1" i="0" kern="1200" spc="10" dirty="0">
-                <a:solidFill>
-                  <a:schemeClr val="bg1"/>
-                </a:solidFill>
-                <a:effectLst/>
-                <a:latin typeface="Brandon Grotesque Black" charset="0"/>
-                <a:ea typeface="Brandon Grotesque Black" charset="0"/>
-                <a:cs typeface="Brandon Grotesque Black" charset="0"/>
-              </a:rPr>
-              <a:t/>
-            </a:r>
             <a:br>
               <a:rPr lang="en-US" sz="1158" b="1" i="0" kern="1200" spc="10" dirty="0">
                 <a:solidFill>
@@ -16831,7 +16787,7 @@
           <p:cNvPr id="37" name="Content Placeholder 52">
             <a:extLst>
               <a:ext uri="{FF2B5EF4-FFF2-40B4-BE49-F238E27FC236}">
-                <a16:creationId xmlns="" xmlns:a16="http://schemas.microsoft.com/office/drawing/2014/main" id="{A1F29D74-7F07-D84E-B102-930FD141E5B9}"/>
+                <a16:creationId xmlns:a16="http://schemas.microsoft.com/office/drawing/2014/main" id="{A1F29D74-7F07-D84E-B102-930FD141E5B9}"/>
               </a:ext>
             </a:extLst>
           </p:cNvPr>
@@ -17067,7 +17023,7 @@
           <p:cNvPr id="38" name="Picture 37">
             <a:extLst>
               <a:ext uri="{FF2B5EF4-FFF2-40B4-BE49-F238E27FC236}">
-                <a16:creationId xmlns="" xmlns:a16="http://schemas.microsoft.com/office/drawing/2014/main" id="{B4EE7BA3-3882-054B-9C71-4C6C9D45BBC3}"/>
+                <a16:creationId xmlns:a16="http://schemas.microsoft.com/office/drawing/2014/main" id="{B4EE7BA3-3882-054B-9C71-4C6C9D45BBC3}"/>
               </a:ext>
             </a:extLst>
           </p:cNvPr>
@@ -17103,7 +17059,7 @@
           <p:cNvPr id="63" name="Hexagon 5">
             <a:extLst>
               <a:ext uri="{FF2B5EF4-FFF2-40B4-BE49-F238E27FC236}">
-                <a16:creationId xmlns="" xmlns:a16="http://schemas.microsoft.com/office/drawing/2014/main" id="{364503C3-2EEB-304D-8F5A-656CAD26AC38}"/>
+                <a16:creationId xmlns:a16="http://schemas.microsoft.com/office/drawing/2014/main" id="{364503C3-2EEB-304D-8F5A-656CAD26AC38}"/>
               </a:ext>
             </a:extLst>
           </p:cNvPr>
@@ -17373,7 +17329,7 @@
           <p:cNvPr id="64" name="Picture 63">
             <a:extLst>
               <a:ext uri="{FF2B5EF4-FFF2-40B4-BE49-F238E27FC236}">
-                <a16:creationId xmlns="" xmlns:a16="http://schemas.microsoft.com/office/drawing/2014/main" id="{6241EA04-8B95-A04D-BFAA-ECA5355B2F83}"/>
+                <a16:creationId xmlns:a16="http://schemas.microsoft.com/office/drawing/2014/main" id="{6241EA04-8B95-A04D-BFAA-ECA5355B2F83}"/>
               </a:ext>
             </a:extLst>
           </p:cNvPr>
@@ -17410,7 +17366,7 @@
             <a:hlinkClick r:id="rId12"/>
             <a:extLst>
               <a:ext uri="{FF2B5EF4-FFF2-40B4-BE49-F238E27FC236}">
-                <a16:creationId xmlns="" xmlns:a16="http://schemas.microsoft.com/office/drawing/2014/main" id="{242972D4-E45D-4C48-98B1-E9B8928925A8}"/>
+                <a16:creationId xmlns:a16="http://schemas.microsoft.com/office/drawing/2014/main" id="{242972D4-E45D-4C48-98B1-E9B8928925A8}"/>
               </a:ext>
             </a:extLst>
           </p:cNvPr>
@@ -17473,7 +17429,7 @@
           <p:cNvPr id="68" name="Content Placeholder 52">
             <a:extLst>
               <a:ext uri="{FF2B5EF4-FFF2-40B4-BE49-F238E27FC236}">
-                <a16:creationId xmlns="" xmlns:a16="http://schemas.microsoft.com/office/drawing/2014/main" id="{B59D4673-E8B1-2C49-81BA-06195A220AB1}"/>
+                <a16:creationId xmlns:a16="http://schemas.microsoft.com/office/drawing/2014/main" id="{B59D4673-E8B1-2C49-81BA-06195A220AB1}"/>
               </a:ext>
             </a:extLst>
           </p:cNvPr>
@@ -17679,7 +17635,7 @@
             <a:hlinkClick r:id="rId12"/>
             <a:extLst>
               <a:ext uri="{FF2B5EF4-FFF2-40B4-BE49-F238E27FC236}">
-                <a16:creationId xmlns="" xmlns:a16="http://schemas.microsoft.com/office/drawing/2014/main" id="{E8323CE4-5234-8142-9DE4-A809DB291451}"/>
+                <a16:creationId xmlns:a16="http://schemas.microsoft.com/office/drawing/2014/main" id="{E8323CE4-5234-8142-9DE4-A809DB291451}"/>
               </a:ext>
             </a:extLst>
           </p:cNvPr>
@@ -17738,7 +17694,7 @@
             <a:hlinkClick r:id="rId3"/>
             <a:extLst>
               <a:ext uri="{FF2B5EF4-FFF2-40B4-BE49-F238E27FC236}">
-                <a16:creationId xmlns="" xmlns:a16="http://schemas.microsoft.com/office/drawing/2014/main" id="{6C78789D-668C-3346-9A82-AE9B686AF055}"/>
+                <a16:creationId xmlns:a16="http://schemas.microsoft.com/office/drawing/2014/main" id="{6C78789D-668C-3346-9A82-AE9B686AF055}"/>
               </a:ext>
             </a:extLst>
           </p:cNvPr>
@@ -17797,7 +17753,7 @@
             <a:hlinkClick r:id="rId2"/>
             <a:extLst>
               <a:ext uri="{FF2B5EF4-FFF2-40B4-BE49-F238E27FC236}">
-                <a16:creationId xmlns="" xmlns:a16="http://schemas.microsoft.com/office/drawing/2014/main" id="{B054C5B9-06BF-FE44-99FF-F2FA5C20AC60}"/>
+                <a16:creationId xmlns:a16="http://schemas.microsoft.com/office/drawing/2014/main" id="{B054C5B9-06BF-FE44-99FF-F2FA5C20AC60}"/>
               </a:ext>
             </a:extLst>
           </p:cNvPr>
@@ -18129,7 +18085,7 @@
           <a:p>
             <a:fld id="{CFBFD163-B769-8340-9BFA-850DE925A786}" type="datetime6">
               <a:rPr lang="fr-FR" smtClean="0"/>
-              <a:t>avril 22</a:t>
+              <a:t>août 23</a:t>
             </a:fld>
             <a:endParaRPr lang="en-US" dirty="0"/>
           </a:p>
@@ -18229,7 +18185,7 @@
           <a:p>
             <a:fld id="{D6DDDD81-934D-2440-96D5-710E55CF1726}" type="datetime6">
               <a:rPr lang="fr-FR" smtClean="0"/>
-              <a:t>avril 22</a:t>
+              <a:t>août 23</a:t>
             </a:fld>
             <a:endParaRPr lang="en-US" dirty="0"/>
           </a:p>
@@ -18895,7 +18851,7 @@
           <a:p>
             <a:fld id="{9FC060DB-6E52-EB46-96C1-740CFB82B988}" type="datetime6">
               <a:rPr lang="fr-FR" smtClean="0"/>
-              <a:t>avril 22</a:t>
+              <a:t>août 23</a:t>
             </a:fld>
             <a:endParaRPr lang="en-US" dirty="0"/>
           </a:p>
@@ -19036,7 +18992,7 @@
           <a:p>
             <a:fld id="{DF677A4E-A05D-044B-B606-EB8FC4116036}" type="datetime6">
               <a:rPr lang="fr-FR" smtClean="0"/>
-              <a:t>avril 22</a:t>
+              <a:t>août 23</a:t>
             </a:fld>
             <a:endParaRPr lang="en-US" dirty="0"/>
           </a:p>
@@ -19311,7 +19267,7 @@
             <a:fld id="{22DD8F49-BF83-0E4D-8954-2DA98C3220A2}" type="datetime6">
               <a:rPr lang="fr-FR" smtClean="0"/>
               <a:pPr/>
-              <a:t>avril 22</a:t>
+              <a:t>août 23</a:t>
             </a:fld>
             <a:endParaRPr lang="en-US" dirty="0"/>
           </a:p>
@@ -19687,7 +19643,7 @@
           <p:cNvPr id="14" name="Slide Number Placeholder 5">
             <a:extLst>
               <a:ext uri="{FF2B5EF4-FFF2-40B4-BE49-F238E27FC236}">
-                <a16:creationId xmlns="" xmlns:a16="http://schemas.microsoft.com/office/drawing/2014/main" id="{D6A5EA0A-9DA9-564F-8F7D-CF263DB84C39}"/>
+                <a16:creationId xmlns:a16="http://schemas.microsoft.com/office/drawing/2014/main" id="{D6A5EA0A-9DA9-564F-8F7D-CF263DB84C39}"/>
               </a:ext>
             </a:extLst>
           </p:cNvPr>
@@ -19825,7 +19781,7 @@
           <p:cNvPr id="21" name="Straight Connector 20">
             <a:extLst>
               <a:ext uri="{FF2B5EF4-FFF2-40B4-BE49-F238E27FC236}">
-                <a16:creationId xmlns="" xmlns:a16="http://schemas.microsoft.com/office/drawing/2014/main" id="{F4443C96-B82D-F449-A71B-02134B6BB207}"/>
+                <a16:creationId xmlns:a16="http://schemas.microsoft.com/office/drawing/2014/main" id="{F4443C96-B82D-F449-A71B-02134B6BB207}"/>
               </a:ext>
             </a:extLst>
           </p:cNvPr>
@@ -19911,7 +19867,7 @@
           <p:cNvPr id="6" name="Picture 5">
             <a:extLst>
               <a:ext uri="{FF2B5EF4-FFF2-40B4-BE49-F238E27FC236}">
-                <a16:creationId xmlns="" xmlns:a16="http://schemas.microsoft.com/office/drawing/2014/main" id="{FFB611C2-DDCE-7F48-9E56-C0AF82F39DC1}"/>
+                <a16:creationId xmlns:a16="http://schemas.microsoft.com/office/drawing/2014/main" id="{FFB611C2-DDCE-7F48-9E56-C0AF82F39DC1}"/>
               </a:ext>
             </a:extLst>
           </p:cNvPr>
@@ -20381,7 +20337,7 @@
           <p:cNvPr id="65" name="Rounded Rectangle 64">
             <a:extLst>
               <a:ext uri="{FF2B5EF4-FFF2-40B4-BE49-F238E27FC236}">
-                <a16:creationId xmlns="" xmlns:a16="http://schemas.microsoft.com/office/drawing/2014/main" id="{68B161DF-0B04-DA43-8872-F08463775AF3}"/>
+                <a16:creationId xmlns:a16="http://schemas.microsoft.com/office/drawing/2014/main" id="{68B161DF-0B04-DA43-8872-F08463775AF3}"/>
               </a:ext>
             </a:extLst>
           </p:cNvPr>
@@ -20445,7 +20401,7 @@
           <p:cNvPr id="4" name="Group 3">
             <a:extLst>
               <a:ext uri="{FF2B5EF4-FFF2-40B4-BE49-F238E27FC236}">
-                <a16:creationId xmlns="" xmlns:a16="http://schemas.microsoft.com/office/drawing/2014/main" id="{3A688394-8EA1-414F-9CFE-8B9F1DA7463F}"/>
+                <a16:creationId xmlns:a16="http://schemas.microsoft.com/office/drawing/2014/main" id="{3A688394-8EA1-414F-9CFE-8B9F1DA7463F}"/>
               </a:ext>
             </a:extLst>
           </p:cNvPr>
@@ -20465,7 +20421,7 @@
             <p:cNvPr id="51" name="Rounded Rectangle 50">
               <a:extLst>
                 <a:ext uri="{FF2B5EF4-FFF2-40B4-BE49-F238E27FC236}">
-                  <a16:creationId xmlns="" xmlns:a16="http://schemas.microsoft.com/office/drawing/2014/main" id="{F6B18FC4-0EC2-D842-9F91-793486EBD6C6}"/>
+                  <a16:creationId xmlns:a16="http://schemas.microsoft.com/office/drawing/2014/main" id="{F6B18FC4-0EC2-D842-9F91-793486EBD6C6}"/>
                 </a:ext>
               </a:extLst>
             </p:cNvPr>
@@ -20582,7 +20538,7 @@
           <p:cNvPr id="54" name="Rounded Rectangle 53">
             <a:extLst>
               <a:ext uri="{FF2B5EF4-FFF2-40B4-BE49-F238E27FC236}">
-                <a16:creationId xmlns="" xmlns:a16="http://schemas.microsoft.com/office/drawing/2014/main" id="{0FF18F5A-C793-934C-8AEF-05C54219B54D}"/>
+                <a16:creationId xmlns:a16="http://schemas.microsoft.com/office/drawing/2014/main" id="{0FF18F5A-C793-934C-8AEF-05C54219B54D}"/>
               </a:ext>
             </a:extLst>
           </p:cNvPr>
@@ -20641,7 +20597,7 @@
           <p:cNvPr id="56" name="Rounded Rectangle 55">
             <a:extLst>
               <a:ext uri="{FF2B5EF4-FFF2-40B4-BE49-F238E27FC236}">
-                <a16:creationId xmlns="" xmlns:a16="http://schemas.microsoft.com/office/drawing/2014/main" id="{DCA0457D-044B-EA4C-9A83-679682284CEE}"/>
+                <a16:creationId xmlns:a16="http://schemas.microsoft.com/office/drawing/2014/main" id="{DCA0457D-044B-EA4C-9A83-679682284CEE}"/>
               </a:ext>
             </a:extLst>
           </p:cNvPr>
@@ -20931,7 +20887,7 @@
           <a:p>
             <a:r>
               <a:rPr lang="en-US" dirty="0"/>
-              <a:t>Platform Builder</a:t>
+              <a:t>VEE Port Builder</a:t>
             </a:r>
           </a:p>
           <a:p>
@@ -21014,7 +20970,7 @@
                 <a:ea typeface="Source Sans Pro" charset="0"/>
                 <a:cs typeface="Source Sans Pro" charset="0"/>
               </a:rPr>
-              <a:t>Demo Platform Sources</a:t>
+              <a:t>Demo VEE Port Sources</a:t>
             </a:r>
           </a:p>
           <a:p>
@@ -21329,7 +21285,7 @@
           <p:cNvPr id="102" name="Picture 101">
             <a:extLst>
               <a:ext uri="{FF2B5EF4-FFF2-40B4-BE49-F238E27FC236}">
-                <a16:creationId xmlns="" xmlns:a16="http://schemas.microsoft.com/office/drawing/2014/main" id="{6E47523C-39E3-414E-8E44-2AF044AA7D00}"/>
+                <a16:creationId xmlns:a16="http://schemas.microsoft.com/office/drawing/2014/main" id="{6E47523C-39E3-414E-8E44-2AF044AA7D00}"/>
               </a:ext>
             </a:extLst>
           </p:cNvPr>
@@ -21562,7 +21518,7 @@
           <p:cNvPr id="43" name="Picture 42">
             <a:extLst>
               <a:ext uri="{FF2B5EF4-FFF2-40B4-BE49-F238E27FC236}">
-                <a16:creationId xmlns="" xmlns:a16="http://schemas.microsoft.com/office/drawing/2014/main" id="{12F00518-C1C0-8D40-A208-E7A5D1093A00}"/>
+                <a16:creationId xmlns:a16="http://schemas.microsoft.com/office/drawing/2014/main" id="{12F00518-C1C0-8D40-A208-E7A5D1093A00}"/>
               </a:ext>
             </a:extLst>
           </p:cNvPr>
@@ -21598,7 +21554,7 @@
           <p:cNvPr id="55" name="Rounded Rectangle 54">
             <a:extLst>
               <a:ext uri="{FF2B5EF4-FFF2-40B4-BE49-F238E27FC236}">
-                <a16:creationId xmlns="" xmlns:a16="http://schemas.microsoft.com/office/drawing/2014/main" id="{323AA134-BF24-B440-8CF0-7162071EAC75}"/>
+                <a16:creationId xmlns:a16="http://schemas.microsoft.com/office/drawing/2014/main" id="{323AA134-BF24-B440-8CF0-7162071EAC75}"/>
               </a:ext>
             </a:extLst>
           </p:cNvPr>
@@ -21752,7 +21708,7 @@
           <a:p>
             <a:r>
               <a:rPr lang="en-US" dirty="0"/>
-              <a:t>Demo Platform Modules</a:t>
+              <a:t>Demo VEE Port Modules</a:t>
             </a:r>
           </a:p>
           <a:p>
@@ -21768,7 +21724,7 @@
           <p:cNvPr id="44" name="Picture 43">
             <a:extLst>
               <a:ext uri="{FF2B5EF4-FFF2-40B4-BE49-F238E27FC236}">
-                <a16:creationId xmlns="" xmlns:a16="http://schemas.microsoft.com/office/drawing/2014/main" id="{C4F5EE46-2BC5-DF40-93A6-0894A861A09D}"/>
+                <a16:creationId xmlns:a16="http://schemas.microsoft.com/office/drawing/2014/main" id="{C4F5EE46-2BC5-DF40-93A6-0894A861A09D}"/>
               </a:ext>
             </a:extLst>
           </p:cNvPr>
@@ -21804,7 +21760,7 @@
           <p:cNvPr id="46" name="TextBox 45">
             <a:extLst>
               <a:ext uri="{FF2B5EF4-FFF2-40B4-BE49-F238E27FC236}">
-                <a16:creationId xmlns="" xmlns:a16="http://schemas.microsoft.com/office/drawing/2014/main" id="{46D7B7A7-B133-1345-B9B7-0C004F631433}"/>
+                <a16:creationId xmlns:a16="http://schemas.microsoft.com/office/drawing/2014/main" id="{46D7B7A7-B133-1345-B9B7-0C004F631433}"/>
               </a:ext>
             </a:extLst>
           </p:cNvPr>
@@ -21857,7 +21813,7 @@
           <p:cNvPr id="47" name="TextBox 46">
             <a:extLst>
               <a:ext uri="{FF2B5EF4-FFF2-40B4-BE49-F238E27FC236}">
-                <a16:creationId xmlns="" xmlns:a16="http://schemas.microsoft.com/office/drawing/2014/main" id="{D2B7D069-2C21-A949-A75B-A94D68B1CB1D}"/>
+                <a16:creationId xmlns:a16="http://schemas.microsoft.com/office/drawing/2014/main" id="{D2B7D069-2C21-A949-A75B-A94D68B1CB1D}"/>
               </a:ext>
             </a:extLst>
           </p:cNvPr>
@@ -21943,7 +21899,7 @@
           <p:cNvPr id="85" name="Rectangle 84">
             <a:extLst>
               <a:ext uri="{FF2B5EF4-FFF2-40B4-BE49-F238E27FC236}">
-                <a16:creationId xmlns="" xmlns:a16="http://schemas.microsoft.com/office/drawing/2014/main" id="{B2FE977E-CFE6-5841-8CE3-8D2664BD1B99}"/>
+                <a16:creationId xmlns:a16="http://schemas.microsoft.com/office/drawing/2014/main" id="{B2FE977E-CFE6-5841-8CE3-8D2664BD1B99}"/>
               </a:ext>
             </a:extLst>
           </p:cNvPr>
@@ -22012,7 +21968,7 @@
           <p:cNvPr id="86" name="Rounded Rectangle 85">
             <a:extLst>
               <a:ext uri="{FF2B5EF4-FFF2-40B4-BE49-F238E27FC236}">
-                <a16:creationId xmlns="" xmlns:a16="http://schemas.microsoft.com/office/drawing/2014/main" id="{500A1F69-90C8-614E-A109-B2AB4C011D21}"/>
+                <a16:creationId xmlns:a16="http://schemas.microsoft.com/office/drawing/2014/main" id="{500A1F69-90C8-614E-A109-B2AB4C011D21}"/>
               </a:ext>
             </a:extLst>
           </p:cNvPr>
@@ -22076,7 +22032,7 @@
           <p:cNvPr id="87" name="Picture 86">
             <a:extLst>
               <a:ext uri="{FF2B5EF4-FFF2-40B4-BE49-F238E27FC236}">
-                <a16:creationId xmlns="" xmlns:a16="http://schemas.microsoft.com/office/drawing/2014/main" id="{50E82368-37D9-DF47-81F6-6FDDE0883723}"/>
+                <a16:creationId xmlns:a16="http://schemas.microsoft.com/office/drawing/2014/main" id="{50E82368-37D9-DF47-81F6-6FDDE0883723}"/>
               </a:ext>
             </a:extLst>
           </p:cNvPr>
@@ -22112,7 +22068,7 @@
           <p:cNvPr id="88" name="Picture 87">
             <a:extLst>
               <a:ext uri="{FF2B5EF4-FFF2-40B4-BE49-F238E27FC236}">
-                <a16:creationId xmlns="" xmlns:a16="http://schemas.microsoft.com/office/drawing/2014/main" id="{5F434DB9-6B3D-CA47-B322-F3CC3A398948}"/>
+                <a16:creationId xmlns:a16="http://schemas.microsoft.com/office/drawing/2014/main" id="{5F434DB9-6B3D-CA47-B322-F3CC3A398948}"/>
               </a:ext>
             </a:extLst>
           </p:cNvPr>
@@ -22148,7 +22104,7 @@
           <p:cNvPr id="90" name="Rounded Rectangle 89">
             <a:extLst>
               <a:ext uri="{FF2B5EF4-FFF2-40B4-BE49-F238E27FC236}">
-                <a16:creationId xmlns="" xmlns:a16="http://schemas.microsoft.com/office/drawing/2014/main" id="{ABAC10A3-2F9D-8845-95D6-EA98A639CD92}"/>
+                <a16:creationId xmlns:a16="http://schemas.microsoft.com/office/drawing/2014/main" id="{ABAC10A3-2F9D-8845-95D6-EA98A639CD92}"/>
               </a:ext>
             </a:extLst>
           </p:cNvPr>
@@ -22212,7 +22168,7 @@
           <p:cNvPr id="92" name="TextBox 91">
             <a:extLst>
               <a:ext uri="{FF2B5EF4-FFF2-40B4-BE49-F238E27FC236}">
-                <a16:creationId xmlns="" xmlns:a16="http://schemas.microsoft.com/office/drawing/2014/main" id="{67C95280-1B8D-1941-BF7A-21E0CE227DE4}"/>
+                <a16:creationId xmlns:a16="http://schemas.microsoft.com/office/drawing/2014/main" id="{67C95280-1B8D-1941-BF7A-21E0CE227DE4}"/>
               </a:ext>
             </a:extLst>
           </p:cNvPr>
@@ -22236,18 +22192,13 @@
           <a:lstStyle/>
           <a:p>
             <a:r>
-              <a:rPr lang="en-US" sz="1400" b="1" dirty="0" smtClean="0">
+              <a:rPr lang="en-US" sz="1400" b="1" dirty="0">
                 <a:latin typeface="Source Sans Pro" charset="0"/>
                 <a:ea typeface="Source Sans Pro" charset="0"/>
                 <a:cs typeface="Source Sans Pro" charset="0"/>
               </a:rPr>
               <a:t>Module Repositories</a:t>
             </a:r>
-            <a:endParaRPr lang="en-US" sz="1400" b="1" dirty="0">
-              <a:latin typeface="Source Sans Pro" charset="0"/>
-              <a:ea typeface="Source Sans Pro" charset="0"/>
-              <a:cs typeface="Source Sans Pro" charset="0"/>
-            </a:endParaRPr>
           </a:p>
         </p:txBody>
       </p:sp>
@@ -22256,7 +22207,7 @@
           <p:cNvPr id="93" name="Picture 92">
             <a:extLst>
               <a:ext uri="{FF2B5EF4-FFF2-40B4-BE49-F238E27FC236}">
-                <a16:creationId xmlns="" xmlns:a16="http://schemas.microsoft.com/office/drawing/2014/main" id="{4EA4C80E-71CE-6F43-AD4A-DABA38A275A2}"/>
+                <a16:creationId xmlns:a16="http://schemas.microsoft.com/office/drawing/2014/main" id="{4EA4C80E-71CE-6F43-AD4A-DABA38A275A2}"/>
               </a:ext>
             </a:extLst>
           </p:cNvPr>
@@ -22293,7 +22244,7 @@
           <p:cNvPr id="94" name="Picture 93">
             <a:extLst>
               <a:ext uri="{FF2B5EF4-FFF2-40B4-BE49-F238E27FC236}">
-                <a16:creationId xmlns="" xmlns:a16="http://schemas.microsoft.com/office/drawing/2014/main" id="{73AF7480-2B09-0942-AAD4-91F4A5814BE4}"/>
+                <a16:creationId xmlns:a16="http://schemas.microsoft.com/office/drawing/2014/main" id="{73AF7480-2B09-0942-AAD4-91F4A5814BE4}"/>
               </a:ext>
             </a:extLst>
           </p:cNvPr>
@@ -22329,7 +22280,7 @@
           <p:cNvPr id="96" name="Picture 95">
             <a:extLst>
               <a:ext uri="{FF2B5EF4-FFF2-40B4-BE49-F238E27FC236}">
-                <a16:creationId xmlns="" xmlns:a16="http://schemas.microsoft.com/office/drawing/2014/main" id="{159EF0D3-DB25-9A4F-89AC-5C47D43EFDEF}"/>
+                <a16:creationId xmlns:a16="http://schemas.microsoft.com/office/drawing/2014/main" id="{159EF0D3-DB25-9A4F-89AC-5C47D43EFDEF}"/>
               </a:ext>
             </a:extLst>
           </p:cNvPr>

</xml_diff>